<commit_message>
fix the twoRounds Graph
</commit_message>
<xml_diff>
--- a/CS/Prospectus/Slides/Jiawen Liu.pptx
+++ b/CS/Prospectus/Slides/Jiawen Liu.pptx
@@ -48,7 +48,7 @@
     <p:sldId id="335" r:id="rId36"/>
     <p:sldId id="336" r:id="rId37"/>
     <p:sldId id="337" r:id="rId38"/>
-    <p:sldId id="339" r:id="rId39"/>
+    <p:sldId id="355" r:id="rId39"/>
     <p:sldId id="311" r:id="rId40"/>
     <p:sldId id="312" r:id="rId41"/>
     <p:sldId id="349" r:id="rId42"/>
@@ -230,7 +230,7 @@
             <p14:sldId id="335"/>
             <p14:sldId id="336"/>
             <p14:sldId id="337"/>
-            <p14:sldId id="339"/>
+            <p14:sldId id="355"/>
             <p14:sldId id="311"/>
             <p14:sldId id="312"/>
             <p14:sldId id="349"/>
@@ -19493,10 +19493,10 @@
       </p:sp>
       <p:pic>
         <p:nvPicPr>
-          <p:cNvPr id="14" name="Content Placeholder 13" descr="Diagram, schematic&#10;&#10;Description automatically generated">
+          <p:cNvPr id="7" name="Content Placeholder 6" descr="Diagram&#10;&#10;Description automatically generated">
             <a:extLst>
               <a:ext uri="{FF2B5EF4-FFF2-40B4-BE49-F238E27FC236}">
-                <a16:creationId xmlns:a16="http://schemas.microsoft.com/office/drawing/2014/main" id="{C527776C-ADD0-0024-EA07-490EA6402B9A}"/>
+                <a16:creationId xmlns:a16="http://schemas.microsoft.com/office/drawing/2014/main" id="{720689B1-C8C5-DA3C-B11F-AF3B89D5689F}"/>
               </a:ext>
             </a:extLst>
           </p:cNvPr>
@@ -19515,8 +19515,8 @@
         </p:blipFill>
         <p:spPr>
           <a:xfrm>
-            <a:off x="2557287" y="1828800"/>
-            <a:ext cx="4029426" cy="3886200"/>
+            <a:off x="2659452" y="1828800"/>
+            <a:ext cx="3825096" cy="3886200"/>
           </a:xfrm>
         </p:spPr>
       </p:pic>
@@ -21177,10 +21177,10 @@
       </p:sp>
       <p:pic>
         <p:nvPicPr>
-          <p:cNvPr id="10" name="Content Placeholder 9" descr="Diagram, schematic&#10;&#10;Description automatically generated">
+          <p:cNvPr id="7" name="Content Placeholder 6" descr="Diagram&#10;&#10;Description automatically generated">
             <a:extLst>
               <a:ext uri="{FF2B5EF4-FFF2-40B4-BE49-F238E27FC236}">
-                <a16:creationId xmlns:a16="http://schemas.microsoft.com/office/drawing/2014/main" id="{6B991A5F-9934-196A-94B6-6B8BEAF0647C}"/>
+                <a16:creationId xmlns:a16="http://schemas.microsoft.com/office/drawing/2014/main" id="{DA7320DC-1587-8210-3979-CD0F45B67966}"/>
               </a:ext>
             </a:extLst>
           </p:cNvPr>
@@ -21199,8 +21199,8 @@
         </p:blipFill>
         <p:spPr>
           <a:xfrm>
-            <a:off x="2581040" y="1828800"/>
-            <a:ext cx="3981919" cy="3886200"/>
+            <a:off x="2892425" y="1905000"/>
+            <a:ext cx="3359150" cy="3554287"/>
           </a:xfrm>
         </p:spPr>
       </p:pic>
@@ -22838,10 +22838,10 @@
       </p:sp>
       <p:pic>
         <p:nvPicPr>
-          <p:cNvPr id="7" name="Content Placeholder 6">
+          <p:cNvPr id="8" name="Content Placeholder 7" descr="Diagram&#10;&#10;Description automatically generated">
             <a:extLst>
               <a:ext uri="{FF2B5EF4-FFF2-40B4-BE49-F238E27FC236}">
-                <a16:creationId xmlns:a16="http://schemas.microsoft.com/office/drawing/2014/main" id="{3E2AC6F8-D19E-172C-2490-FB323D06B945}"/>
+                <a16:creationId xmlns:a16="http://schemas.microsoft.com/office/drawing/2014/main" id="{9FFE2EF6-6E71-32C0-04AA-15D102523AC3}"/>
               </a:ext>
             </a:extLst>
           </p:cNvPr>
@@ -22860,8 +22860,8 @@
         </p:blipFill>
         <p:spPr>
           <a:xfrm>
-            <a:off x="2895600" y="2032000"/>
-            <a:ext cx="3352800" cy="3479800"/>
+            <a:off x="2785796" y="1828800"/>
+            <a:ext cx="3572407" cy="3886200"/>
           </a:xfrm>
         </p:spPr>
       </p:pic>
@@ -22918,7 +22918,7 @@
           <a:p>
             <a:r>
               <a:rPr lang="en-US" dirty="0"/>
-              <a:t>Adaptivity Estimation – Longest Finite Walk Estimation</a:t>
+              <a:t>Adaptivity Estimation –Longest Finite Walk Estimation</a:t>
             </a:r>
           </a:p>
         </p:txBody>
@@ -22995,10 +22995,10 @@
       </p:sp>
       <p:pic>
         <p:nvPicPr>
-          <p:cNvPr id="7" name="Content Placeholder 6" descr="Diagram&#10;&#10;Description automatically generated">
+          <p:cNvPr id="8" name="Content Placeholder 7">
             <a:extLst>
               <a:ext uri="{FF2B5EF4-FFF2-40B4-BE49-F238E27FC236}">
-                <a16:creationId xmlns:a16="http://schemas.microsoft.com/office/drawing/2014/main" id="{95893E87-A4A8-F3E4-1825-8D602A2B621A}"/>
+                <a16:creationId xmlns:a16="http://schemas.microsoft.com/office/drawing/2014/main" id="{9FFE2EF6-6E71-32C0-04AA-15D102523AC3}"/>
               </a:ext>
             </a:extLst>
           </p:cNvPr>
@@ -23011,21 +23011,20 @@
         </p:nvPicPr>
         <p:blipFill>
           <a:blip r:embed="rId2"/>
-          <a:stretch>
-            <a:fillRect/>
-          </a:stretch>
+          <a:srcRect/>
+          <a:stretch/>
         </p:blipFill>
         <p:spPr>
           <a:xfrm>
-            <a:off x="2901950" y="2051050"/>
-            <a:ext cx="3340100" cy="3441700"/>
+            <a:off x="2743200" y="1905000"/>
+            <a:ext cx="3691204" cy="3784483"/>
           </a:xfrm>
         </p:spPr>
       </p:pic>
     </p:spTree>
     <p:extLst>
       <p:ext uri="{BB962C8B-B14F-4D97-AF65-F5344CB8AC3E}">
-        <p14:creationId xmlns:p14="http://schemas.microsoft.com/office/powerpoint/2010/main" val="1164842823"/>
+        <p14:creationId xmlns:p14="http://schemas.microsoft.com/office/powerpoint/2010/main" val="3470139933"/>
       </p:ext>
     </p:extLst>
   </p:cSld>

</xml_diff>

<commit_message>
revise proposal, slides and thesis
</commit_message>
<xml_diff>
--- a/CS/Prospectus/Slides/Jiawen Liu.pptx
+++ b/CS/Prospectus/Slides/Jiawen Liu.pptx
@@ -16728,10 +16728,10 @@
       </p:sp>
       <p:pic>
         <p:nvPicPr>
-          <p:cNvPr id="7" name="Picture 6" descr="Graphical user interface, application&#10;&#10;Description automatically generated">
+          <p:cNvPr id="8" name="Picture 7" descr="Graphical user interface, application&#10;&#10;Description automatically generated">
             <a:extLst>
               <a:ext uri="{FF2B5EF4-FFF2-40B4-BE49-F238E27FC236}">
-                <a16:creationId xmlns:a16="http://schemas.microsoft.com/office/drawing/2014/main" id="{584710CA-24D7-7095-E602-D5A9880CDFFC}"/>
+                <a16:creationId xmlns:a16="http://schemas.microsoft.com/office/drawing/2014/main" id="{333BEDF2-5E42-C8BF-5456-0FEA60B5FDEF}"/>
               </a:ext>
             </a:extLst>
           </p:cNvPr>
@@ -16748,8 +16748,8 @@
         </p:blipFill>
         <p:spPr>
           <a:xfrm>
-            <a:off x="0" y="2432538"/>
-            <a:ext cx="9144000" cy="3282462"/>
+            <a:off x="32657" y="2507602"/>
+            <a:ext cx="9144000" cy="3207398"/>
           </a:xfrm>
           <a:prstGeom prst="rect">
             <a:avLst/>
@@ -17591,73 +17591,666 @@
           </a:p>
         </p:txBody>
       </p:sp>
-      <p:sp>
-        <p:nvSpPr>
-          <p:cNvPr id="3" name="Content Placeholder 2">
-            <a:extLst>
-              <a:ext uri="{FF2B5EF4-FFF2-40B4-BE49-F238E27FC236}">
-                <a16:creationId xmlns:a16="http://schemas.microsoft.com/office/drawing/2014/main" id="{21FEB544-1C21-D58F-0663-7429C090E156}"/>
-              </a:ext>
-            </a:extLst>
-          </p:cNvPr>
-          <p:cNvSpPr>
-            <a:spLocks noGrp="1"/>
-          </p:cNvSpPr>
-          <p:nvPr>
-            <p:ph idx="1"/>
-          </p:nvPr>
-        </p:nvSpPr>
-        <p:spPr/>
-        <p:txBody>
-          <a:bodyPr/>
-          <a:lstStyle/>
-          <a:p>
-            <a:r>
-              <a:rPr lang="en-US" dirty="0"/>
-              <a:t>For each pair of two variables X, Y, under an initial trace:</a:t>
-            </a:r>
-          </a:p>
-          <a:p>
-            <a:r>
-              <a:rPr lang="en-US" dirty="0"/>
-              <a:t>execution trace T1: </a:t>
-            </a:r>
-          </a:p>
-          <a:p>
-            <a:r>
-              <a:rPr lang="en-US" dirty="0"/>
-              <a:t>change variable X: </a:t>
-            </a:r>
-          </a:p>
-          <a:p>
-            <a:r>
-              <a:rPr lang="en-US" dirty="0"/>
-              <a:t>execution trace T2:</a:t>
-            </a:r>
-          </a:p>
-          <a:p>
-            <a:endParaRPr lang="en-US" dirty="0"/>
-          </a:p>
-          <a:p>
-            <a:r>
-              <a:rPr lang="en-US" dirty="0"/>
-              <a:t>Observe changes in execution traces</a:t>
-            </a:r>
-          </a:p>
-          <a:p>
-            <a:r>
-              <a:rPr lang="en-US" dirty="0"/>
-              <a:t>Variable Y changed =&gt; Dependent </a:t>
-            </a:r>
-          </a:p>
-          <a:p>
-            <a:r>
-              <a:rPr lang="en-US" dirty="0"/>
-              <a:t>Variable Y Disappeared =&gt; Dependent</a:t>
-            </a:r>
-          </a:p>
-        </p:txBody>
-      </p:sp>
+      <mc:AlternateContent xmlns:mc="http://schemas.openxmlformats.org/markup-compatibility/2006" xmlns:a14="http://schemas.microsoft.com/office/drawing/2010/main">
+        <mc:Choice Requires="a14">
+          <p:sp>
+            <p:nvSpPr>
+              <p:cNvPr id="3" name="Content Placeholder 2">
+                <a:extLst>
+                  <a:ext uri="{FF2B5EF4-FFF2-40B4-BE49-F238E27FC236}">
+                    <a16:creationId xmlns:a16="http://schemas.microsoft.com/office/drawing/2014/main" id="{21FEB544-1C21-D58F-0663-7429C090E156}"/>
+                  </a:ext>
+                </a:extLst>
+              </p:cNvPr>
+              <p:cNvSpPr>
+                <a:spLocks noGrp="1"/>
+              </p:cNvSpPr>
+              <p:nvPr>
+                <p:ph idx="1"/>
+              </p:nvPr>
+            </p:nvSpPr>
+            <p:spPr/>
+            <p:txBody>
+              <a:bodyPr/>
+              <a:lstStyle/>
+              <a:p>
+                <a:r>
+                  <a:rPr lang="en-US" dirty="0"/>
+                  <a:t>Each pair of labeled variables </a:t>
+                </a:r>
+                <a14:m>
+                  <m:oMath xmlns:m="http://schemas.openxmlformats.org/officeDocument/2006/math">
+                    <m:sSup>
+                      <m:sSupPr>
+                        <m:ctrlPr>
+                          <a:rPr lang="en-US" i="1" dirty="0" smtClean="0">
+                            <a:latin typeface="Cambria Math" panose="02040503050406030204" pitchFamily="18" charset="0"/>
+                          </a:rPr>
+                        </m:ctrlPr>
+                      </m:sSupPr>
+                      <m:e>
+                        <m:r>
+                          <a:rPr lang="en-US" b="0" i="1" dirty="0" smtClean="0">
+                            <a:latin typeface="Cambria Math" panose="02040503050406030204" pitchFamily="18" charset="0"/>
+                          </a:rPr>
+                          <m:t>(</m:t>
+                        </m:r>
+                        <m:r>
+                          <a:rPr lang="en-US" b="0" i="1" dirty="0" smtClean="0">
+                            <a:latin typeface="Cambria Math" panose="02040503050406030204" pitchFamily="18" charset="0"/>
+                          </a:rPr>
+                          <m:t>𝑥</m:t>
+                        </m:r>
+                      </m:e>
+                      <m:sup>
+                        <m:r>
+                          <a:rPr lang="en-US" b="0" i="1" dirty="0" smtClean="0">
+                            <a:latin typeface="Cambria Math" panose="02040503050406030204" pitchFamily="18" charset="0"/>
+                          </a:rPr>
+                          <m:t>𝑖</m:t>
+                        </m:r>
+                      </m:sup>
+                    </m:sSup>
+                    <m:r>
+                      <a:rPr lang="en-US" i="1" dirty="0">
+                        <a:latin typeface="Cambria Math" panose="02040503050406030204" pitchFamily="18" charset="0"/>
+                      </a:rPr>
+                      <m:t>, </m:t>
+                    </m:r>
+                    <m:sSup>
+                      <m:sSupPr>
+                        <m:ctrlPr>
+                          <a:rPr lang="en-US" b="0" i="1" dirty="0" smtClean="0">
+                            <a:latin typeface="Cambria Math" panose="02040503050406030204" pitchFamily="18" charset="0"/>
+                          </a:rPr>
+                        </m:ctrlPr>
+                      </m:sSupPr>
+                      <m:e>
+                        <m:r>
+                          <a:rPr lang="en-US" b="0" i="1" dirty="0" smtClean="0">
+                            <a:latin typeface="Cambria Math" panose="02040503050406030204" pitchFamily="18" charset="0"/>
+                          </a:rPr>
+                          <m:t>𝑦</m:t>
+                        </m:r>
+                      </m:e>
+                      <m:sup>
+                        <m:r>
+                          <a:rPr lang="en-US" b="0" i="1" dirty="0" smtClean="0">
+                            <a:latin typeface="Cambria Math" panose="02040503050406030204" pitchFamily="18" charset="0"/>
+                          </a:rPr>
+                          <m:t>𝑗</m:t>
+                        </m:r>
+                      </m:sup>
+                    </m:sSup>
+                    <m:r>
+                      <a:rPr lang="en-US" b="0" i="1" dirty="0" smtClean="0">
+                        <a:latin typeface="Cambria Math" panose="02040503050406030204" pitchFamily="18" charset="0"/>
+                      </a:rPr>
+                      <m:t>)</m:t>
+                    </m:r>
+                  </m:oMath>
+                </a14:m>
+                <a:r>
+                  <a:rPr lang="en-US" dirty="0"/>
+                  <a:t>, w</a:t>
+                </a:r>
+                <a:r>
+                  <a:rPr lang="en-US" dirty="0" err="1"/>
+                  <a:t>.r.t.</a:t>
+                </a:r>
+                <a:r>
+                  <a:rPr lang="en-US" dirty="0"/>
+                  <a:t> an initial trace:</a:t>
+                </a:r>
+              </a:p>
+              <a:p>
+                <a:pPr marL="0" indent="0" algn="ctr">
+                  <a:buNone/>
+                </a:pPr>
+                <a:r>
+                  <a:rPr lang="en-US" dirty="0"/>
+                  <a:t>execution trace </a:t>
+                </a:r>
+                <a14:m>
+                  <m:oMath xmlns:m="http://schemas.openxmlformats.org/officeDocument/2006/math">
+                    <m:sSub>
+                      <m:sSubPr>
+                        <m:ctrlPr>
+                          <a:rPr lang="en-US" i="1">
+                            <a:latin typeface="Cambria Math" panose="02040503050406030204" pitchFamily="18" charset="0"/>
+                          </a:rPr>
+                        </m:ctrlPr>
+                      </m:sSubPr>
+                      <m:e>
+                        <m:r>
+                          <a:rPr lang="en-US" i="1">
+                            <a:latin typeface="Cambria Math" panose="02040503050406030204" pitchFamily="18" charset="0"/>
+                          </a:rPr>
+                          <m:t>𝑡</m:t>
+                        </m:r>
+                      </m:e>
+                      <m:sub>
+                        <m:r>
+                          <a:rPr lang="en-US" i="1">
+                            <a:latin typeface="Cambria Math" panose="02040503050406030204" pitchFamily="18" charset="0"/>
+                          </a:rPr>
+                          <m:t>1</m:t>
+                        </m:r>
+                      </m:sub>
+                    </m:sSub>
+                    <m:r>
+                      <a:rPr lang="en-US" i="1">
+                        <a:latin typeface="Cambria Math" panose="02040503050406030204" pitchFamily="18" charset="0"/>
+                      </a:rPr>
+                      <m:t> </m:t>
+                    </m:r>
+                  </m:oMath>
+                </a14:m>
+                <a:endParaRPr lang="en-US" dirty="0"/>
+              </a:p>
+              <a:p>
+                <a:pPr marL="0" indent="0" algn="ctr">
+                  <a:buNone/>
+                </a:pPr>
+                <a:r>
+                  <a:rPr lang="en-US" dirty="0"/>
+                  <a:t>change value of variable </a:t>
+                </a:r>
+                <a14:m>
+                  <m:oMath xmlns:m="http://schemas.openxmlformats.org/officeDocument/2006/math">
+                    <m:sSup>
+                      <m:sSupPr>
+                        <m:ctrlPr>
+                          <a:rPr lang="en-US" i="1" dirty="0">
+                            <a:latin typeface="Cambria Math" panose="02040503050406030204" pitchFamily="18" charset="0"/>
+                          </a:rPr>
+                        </m:ctrlPr>
+                      </m:sSupPr>
+                      <m:e>
+                        <m:r>
+                          <a:rPr lang="en-US" b="0" i="1" dirty="0" smtClean="0">
+                            <a:latin typeface="Cambria Math" panose="02040503050406030204" pitchFamily="18" charset="0"/>
+                          </a:rPr>
+                          <m:t>𝑥</m:t>
+                        </m:r>
+                      </m:e>
+                      <m:sup>
+                        <m:r>
+                          <a:rPr lang="en-US" i="1" dirty="0">
+                            <a:latin typeface="Cambria Math" panose="02040503050406030204" pitchFamily="18" charset="0"/>
+                          </a:rPr>
+                          <m:t>𝑖</m:t>
+                        </m:r>
+                      </m:sup>
+                    </m:sSup>
+                  </m:oMath>
+                </a14:m>
+                <a:r>
+                  <a:rPr lang="en-US" dirty="0"/>
+                  <a:t> in </a:t>
+                </a:r>
+                <a14:m>
+                  <m:oMath xmlns:m="http://schemas.openxmlformats.org/officeDocument/2006/math">
+                    <m:sSub>
+                      <m:sSubPr>
+                        <m:ctrlPr>
+                          <a:rPr lang="en-US" i="1" smtClean="0">
+                            <a:latin typeface="Cambria Math" panose="02040503050406030204" pitchFamily="18" charset="0"/>
+                          </a:rPr>
+                        </m:ctrlPr>
+                      </m:sSubPr>
+                      <m:e>
+                        <m:r>
+                          <a:rPr lang="en-US" b="0" i="1" smtClean="0">
+                            <a:latin typeface="Cambria Math" panose="02040503050406030204" pitchFamily="18" charset="0"/>
+                          </a:rPr>
+                          <m:t>𝑡</m:t>
+                        </m:r>
+                      </m:e>
+                      <m:sub>
+                        <m:r>
+                          <a:rPr lang="en-US" b="0" i="1" smtClean="0">
+                            <a:latin typeface="Cambria Math" panose="02040503050406030204" pitchFamily="18" charset="0"/>
+                          </a:rPr>
+                          <m:t>1</m:t>
+                        </m:r>
+                      </m:sub>
+                    </m:sSub>
+                  </m:oMath>
+                </a14:m>
+                <a:r>
+                  <a:rPr lang="en-US" dirty="0"/>
+                  <a:t>: </a:t>
+                </a:r>
+              </a:p>
+              <a:p>
+                <a:pPr marL="0" indent="0" algn="ctr">
+                  <a:buNone/>
+                </a:pPr>
+                <a:r>
+                  <a:rPr lang="en-US" dirty="0"/>
+                  <a:t>execution trace </a:t>
+                </a:r>
+                <a14:m>
+                  <m:oMath xmlns:m="http://schemas.openxmlformats.org/officeDocument/2006/math">
+                    <m:sSub>
+                      <m:sSubPr>
+                        <m:ctrlPr>
+                          <a:rPr lang="en-US" i="1">
+                            <a:latin typeface="Cambria Math" panose="02040503050406030204" pitchFamily="18" charset="0"/>
+                          </a:rPr>
+                        </m:ctrlPr>
+                      </m:sSubPr>
+                      <m:e>
+                        <m:r>
+                          <a:rPr lang="en-US" i="1">
+                            <a:latin typeface="Cambria Math" panose="02040503050406030204" pitchFamily="18" charset="0"/>
+                          </a:rPr>
+                          <m:t>𝑡</m:t>
+                        </m:r>
+                      </m:e>
+                      <m:sub>
+                        <m:r>
+                          <a:rPr lang="en-US" b="0" i="1" smtClean="0">
+                            <a:latin typeface="Cambria Math" panose="02040503050406030204" pitchFamily="18" charset="0"/>
+                          </a:rPr>
+                          <m:t>2</m:t>
+                        </m:r>
+                      </m:sub>
+                    </m:sSub>
+                    <m:r>
+                      <a:rPr lang="en-US" i="1">
+                        <a:latin typeface="Cambria Math" panose="02040503050406030204" pitchFamily="18" charset="0"/>
+                      </a:rPr>
+                      <m:t> </m:t>
+                    </m:r>
+                  </m:oMath>
+                </a14:m>
+                <a:endParaRPr lang="en-US" dirty="0"/>
+              </a:p>
+              <a:p>
+                <a:r>
+                  <a:rPr lang="en-US" dirty="0"/>
+                  <a:t>Dependent in two cases (</a:t>
+                </a:r>
+                <a:r>
+                  <a:rPr lang="en-US" sz="2000" b="1" dirty="0">
+                    <a:solidFill>
+                      <a:srgbClr val="FF0000"/>
+                    </a:solidFill>
+                  </a:rPr>
+                  <a:t>observe changes of </a:t>
+                </a:r>
+                <a14:m>
+                  <m:oMath xmlns:m="http://schemas.openxmlformats.org/officeDocument/2006/math">
+                    <m:sSup>
+                      <m:sSupPr>
+                        <m:ctrlPr>
+                          <a:rPr lang="en-US" sz="2000" b="1" i="1" dirty="0">
+                            <a:solidFill>
+                              <a:srgbClr val="FF0000"/>
+                            </a:solidFill>
+                            <a:latin typeface="Cambria Math" panose="02040503050406030204" pitchFamily="18" charset="0"/>
+                          </a:rPr>
+                        </m:ctrlPr>
+                      </m:sSupPr>
+                      <m:e>
+                        <m:r>
+                          <a:rPr lang="en-US" sz="2000" b="1" i="1" dirty="0">
+                            <a:solidFill>
+                              <a:srgbClr val="FF0000"/>
+                            </a:solidFill>
+                            <a:latin typeface="Cambria Math" panose="02040503050406030204" pitchFamily="18" charset="0"/>
+                          </a:rPr>
+                          <m:t>𝒚</m:t>
+                        </m:r>
+                      </m:e>
+                      <m:sup>
+                        <m:r>
+                          <a:rPr lang="en-US" sz="2000" b="1" i="1" dirty="0">
+                            <a:solidFill>
+                              <a:srgbClr val="FF0000"/>
+                            </a:solidFill>
+                            <a:latin typeface="Cambria Math" panose="02040503050406030204" pitchFamily="18" charset="0"/>
+                          </a:rPr>
+                          <m:t>𝒋</m:t>
+                        </m:r>
+                      </m:sup>
+                    </m:sSup>
+                  </m:oMath>
+                </a14:m>
+                <a:r>
+                  <a:rPr lang="en-US" sz="2000" b="1" dirty="0">
+                    <a:solidFill>
+                      <a:srgbClr val="FF0000"/>
+                    </a:solidFill>
+                  </a:rPr>
+                  <a:t> in </a:t>
+                </a:r>
+                <a14:m>
+                  <m:oMath xmlns:m="http://schemas.openxmlformats.org/officeDocument/2006/math">
+                    <m:sSub>
+                      <m:sSubPr>
+                        <m:ctrlPr>
+                          <a:rPr lang="en-US" sz="2000" b="1" i="1">
+                            <a:solidFill>
+                              <a:srgbClr val="FF0000"/>
+                            </a:solidFill>
+                            <a:latin typeface="Cambria Math" panose="02040503050406030204" pitchFamily="18" charset="0"/>
+                          </a:rPr>
+                        </m:ctrlPr>
+                      </m:sSubPr>
+                      <m:e>
+                        <m:r>
+                          <a:rPr lang="en-US" sz="2000" b="1" i="1">
+                            <a:solidFill>
+                              <a:srgbClr val="FF0000"/>
+                            </a:solidFill>
+                            <a:latin typeface="Cambria Math" panose="02040503050406030204" pitchFamily="18" charset="0"/>
+                          </a:rPr>
+                          <m:t>𝒕</m:t>
+                        </m:r>
+                      </m:e>
+                      <m:sub>
+                        <m:r>
+                          <a:rPr lang="en-US" sz="2000" b="1" i="1">
+                            <a:solidFill>
+                              <a:srgbClr val="FF0000"/>
+                            </a:solidFill>
+                            <a:latin typeface="Cambria Math" panose="02040503050406030204" pitchFamily="18" charset="0"/>
+                          </a:rPr>
+                          <m:t>𝟏</m:t>
+                        </m:r>
+                      </m:sub>
+                    </m:sSub>
+                  </m:oMath>
+                </a14:m>
+                <a:r>
+                  <a:rPr lang="en-US" sz="2000" b="1" dirty="0">
+                    <a:solidFill>
+                      <a:srgbClr val="FF0000"/>
+                    </a:solidFill>
+                  </a:rPr>
+                  <a:t> and  </a:t>
+                </a:r>
+                <a14:m>
+                  <m:oMath xmlns:m="http://schemas.openxmlformats.org/officeDocument/2006/math">
+                    <m:sSub>
+                      <m:sSubPr>
+                        <m:ctrlPr>
+                          <a:rPr lang="en-US" sz="2000" b="1" i="1">
+                            <a:solidFill>
+                              <a:srgbClr val="FF0000"/>
+                            </a:solidFill>
+                            <a:latin typeface="Cambria Math" panose="02040503050406030204" pitchFamily="18" charset="0"/>
+                          </a:rPr>
+                        </m:ctrlPr>
+                      </m:sSubPr>
+                      <m:e>
+                        <m:r>
+                          <a:rPr lang="en-US" sz="2000" b="1" i="1">
+                            <a:solidFill>
+                              <a:srgbClr val="FF0000"/>
+                            </a:solidFill>
+                            <a:latin typeface="Cambria Math" panose="02040503050406030204" pitchFamily="18" charset="0"/>
+                          </a:rPr>
+                          <m:t>𝒕</m:t>
+                        </m:r>
+                      </m:e>
+                      <m:sub>
+                        <m:r>
+                          <a:rPr lang="en-US" sz="2000" b="1" i="1">
+                            <a:solidFill>
+                              <a:srgbClr val="FF0000"/>
+                            </a:solidFill>
+                            <a:latin typeface="Cambria Math" panose="02040503050406030204" pitchFamily="18" charset="0"/>
+                          </a:rPr>
+                          <m:t>𝟐</m:t>
+                        </m:r>
+                      </m:sub>
+                    </m:sSub>
+                    <m:r>
+                      <a:rPr lang="en-US" sz="2000" i="1">
+                        <a:latin typeface="Cambria Math" panose="02040503050406030204" pitchFamily="18" charset="0"/>
+                      </a:rPr>
+                      <m:t> </m:t>
+                    </m:r>
+                  </m:oMath>
+                </a14:m>
+                <a:r>
+                  <a:rPr lang="en-US" dirty="0"/>
+                  <a:t>):</a:t>
+                </a:r>
+              </a:p>
+              <a:p>
+                <a:pPr marL="0" indent="0" algn="ctr">
+                  <a:buNone/>
+                </a:pPr>
+                <a:r>
+                  <a:rPr lang="en-US" dirty="0"/>
+                  <a:t>Value of </a:t>
+                </a:r>
+                <a14:m>
+                  <m:oMath xmlns:m="http://schemas.openxmlformats.org/officeDocument/2006/math">
+                    <m:sSup>
+                      <m:sSupPr>
+                        <m:ctrlPr>
+                          <a:rPr lang="en-US" i="1" dirty="0">
+                            <a:latin typeface="Cambria Math" panose="02040503050406030204" pitchFamily="18" charset="0"/>
+                          </a:rPr>
+                        </m:ctrlPr>
+                      </m:sSupPr>
+                      <m:e>
+                        <m:r>
+                          <a:rPr lang="en-US" i="1" dirty="0">
+                            <a:latin typeface="Cambria Math" panose="02040503050406030204" pitchFamily="18" charset="0"/>
+                          </a:rPr>
+                          <m:t>𝑦</m:t>
+                        </m:r>
+                      </m:e>
+                      <m:sup>
+                        <m:r>
+                          <a:rPr lang="en-US" i="1" dirty="0">
+                            <a:latin typeface="Cambria Math" panose="02040503050406030204" pitchFamily="18" charset="0"/>
+                          </a:rPr>
+                          <m:t>𝑗</m:t>
+                        </m:r>
+                      </m:sup>
+                    </m:sSup>
+                  </m:oMath>
+                </a14:m>
+                <a:r>
+                  <a:rPr lang="en-US" dirty="0"/>
+                  <a:t> in </a:t>
+                </a:r>
+                <a14:m>
+                  <m:oMath xmlns:m="http://schemas.openxmlformats.org/officeDocument/2006/math">
+                    <m:sSub>
+                      <m:sSubPr>
+                        <m:ctrlPr>
+                          <a:rPr lang="en-US" i="1">
+                            <a:latin typeface="Cambria Math" panose="02040503050406030204" pitchFamily="18" charset="0"/>
+                          </a:rPr>
+                        </m:ctrlPr>
+                      </m:sSubPr>
+                      <m:e>
+                        <m:r>
+                          <a:rPr lang="en-US" i="1">
+                            <a:latin typeface="Cambria Math" panose="02040503050406030204" pitchFamily="18" charset="0"/>
+                          </a:rPr>
+                          <m:t>𝑡</m:t>
+                        </m:r>
+                      </m:e>
+                      <m:sub>
+                        <m:r>
+                          <a:rPr lang="en-US" i="1">
+                            <a:latin typeface="Cambria Math" panose="02040503050406030204" pitchFamily="18" charset="0"/>
+                          </a:rPr>
+                          <m:t>1</m:t>
+                        </m:r>
+                      </m:sub>
+                    </m:sSub>
+                  </m:oMath>
+                </a14:m>
+                <a:r>
+                  <a:rPr lang="en-US" dirty="0"/>
+                  <a:t> and  </a:t>
+                </a:r>
+                <a14:m>
+                  <m:oMath xmlns:m="http://schemas.openxmlformats.org/officeDocument/2006/math">
+                    <m:sSub>
+                      <m:sSubPr>
+                        <m:ctrlPr>
+                          <a:rPr lang="en-US" i="1">
+                            <a:latin typeface="Cambria Math" panose="02040503050406030204" pitchFamily="18" charset="0"/>
+                          </a:rPr>
+                        </m:ctrlPr>
+                      </m:sSubPr>
+                      <m:e>
+                        <m:r>
+                          <a:rPr lang="en-US" i="1">
+                            <a:latin typeface="Cambria Math" panose="02040503050406030204" pitchFamily="18" charset="0"/>
+                          </a:rPr>
+                          <m:t>𝑡</m:t>
+                        </m:r>
+                      </m:e>
+                      <m:sub>
+                        <m:r>
+                          <a:rPr lang="en-US" i="1">
+                            <a:latin typeface="Cambria Math" panose="02040503050406030204" pitchFamily="18" charset="0"/>
+                          </a:rPr>
+                          <m:t>2</m:t>
+                        </m:r>
+                      </m:sub>
+                    </m:sSub>
+                    <m:r>
+                      <a:rPr lang="en-US" i="1">
+                        <a:latin typeface="Cambria Math" panose="02040503050406030204" pitchFamily="18" charset="0"/>
+                      </a:rPr>
+                      <m:t> </m:t>
+                    </m:r>
+                  </m:oMath>
+                </a14:m>
+                <a:r>
+                  <a:rPr lang="en-US" dirty="0"/>
+                  <a:t> changed</a:t>
+                </a:r>
+              </a:p>
+              <a:p>
+                <a:pPr marL="0" indent="0" algn="ctr">
+                  <a:buNone/>
+                </a:pPr>
+                <a:r>
+                  <a:rPr lang="en-US" dirty="0"/>
+                  <a:t>Variable </a:t>
+                </a:r>
+                <a14:m>
+                  <m:oMath xmlns:m="http://schemas.openxmlformats.org/officeDocument/2006/math">
+                    <m:sSup>
+                      <m:sSupPr>
+                        <m:ctrlPr>
+                          <a:rPr lang="en-US" i="1" dirty="0">
+                            <a:latin typeface="Cambria Math" panose="02040503050406030204" pitchFamily="18" charset="0"/>
+                          </a:rPr>
+                        </m:ctrlPr>
+                      </m:sSupPr>
+                      <m:e>
+                        <m:r>
+                          <a:rPr lang="en-US" i="1" dirty="0">
+                            <a:latin typeface="Cambria Math" panose="02040503050406030204" pitchFamily="18" charset="0"/>
+                          </a:rPr>
+                          <m:t>𝑦</m:t>
+                        </m:r>
+                      </m:e>
+                      <m:sup>
+                        <m:r>
+                          <a:rPr lang="en-US" i="1" dirty="0">
+                            <a:latin typeface="Cambria Math" panose="02040503050406030204" pitchFamily="18" charset="0"/>
+                          </a:rPr>
+                          <m:t>𝑗</m:t>
+                        </m:r>
+                      </m:sup>
+                    </m:sSup>
+                  </m:oMath>
+                </a14:m>
+                <a:r>
+                  <a:rPr lang="en-US" dirty="0"/>
+                  <a:t> disappeared in </a:t>
+                </a:r>
+                <a14:m>
+                  <m:oMath xmlns:m="http://schemas.openxmlformats.org/officeDocument/2006/math">
+                    <m:sSub>
+                      <m:sSubPr>
+                        <m:ctrlPr>
+                          <a:rPr lang="en-US" i="1">
+                            <a:latin typeface="Cambria Math" panose="02040503050406030204" pitchFamily="18" charset="0"/>
+                          </a:rPr>
+                        </m:ctrlPr>
+                      </m:sSubPr>
+                      <m:e>
+                        <m:r>
+                          <a:rPr lang="en-US" i="1">
+                            <a:latin typeface="Cambria Math" panose="02040503050406030204" pitchFamily="18" charset="0"/>
+                          </a:rPr>
+                          <m:t>𝑡</m:t>
+                        </m:r>
+                      </m:e>
+                      <m:sub>
+                        <m:r>
+                          <a:rPr lang="en-US" i="1">
+                            <a:latin typeface="Cambria Math" panose="02040503050406030204" pitchFamily="18" charset="0"/>
+                          </a:rPr>
+                          <m:t>2</m:t>
+                        </m:r>
+                      </m:sub>
+                    </m:sSub>
+                  </m:oMath>
+                </a14:m>
+                <a:endParaRPr lang="en-US" dirty="0"/>
+              </a:p>
+            </p:txBody>
+          </p:sp>
+        </mc:Choice>
+        <mc:Fallback xmlns="">
+          <p:sp>
+            <p:nvSpPr>
+              <p:cNvPr id="3" name="Content Placeholder 2">
+                <a:extLst>
+                  <a:ext uri="{FF2B5EF4-FFF2-40B4-BE49-F238E27FC236}">
+                    <a16:creationId xmlns:a16="http://schemas.microsoft.com/office/drawing/2014/main" id="{21FEB544-1C21-D58F-0663-7429C090E156}"/>
+                  </a:ext>
+                </a:extLst>
+              </p:cNvPr>
+              <p:cNvSpPr>
+                <a:spLocks noGrp="1" noRot="1" noChangeAspect="1" noMove="1" noResize="1" noEditPoints="1" noAdjustHandles="1" noChangeArrowheads="1" noChangeShapeType="1" noTextEdit="1"/>
+              </p:cNvSpPr>
+              <p:nvPr>
+                <p:ph idx="1"/>
+              </p:nvPr>
+            </p:nvSpPr>
+            <p:spPr>
+              <a:blipFill>
+                <a:blip r:embed="rId2"/>
+                <a:stretch>
+                  <a:fillRect l="-1122" t="-977"/>
+                </a:stretch>
+              </a:blipFill>
+            </p:spPr>
+            <p:txBody>
+              <a:bodyPr/>
+              <a:lstStyle/>
+              <a:p>
+                <a:r>
+                  <a:rPr lang="en-US">
+                    <a:noFill/>
+                  </a:rPr>
+                  <a:t> </a:t>
+                </a:r>
+              </a:p>
+            </p:txBody>
+          </p:sp>
+        </mc:Fallback>
+      </mc:AlternateContent>
       <p:sp>
         <p:nvSpPr>
           <p:cNvPr id="4" name="Footer Placeholder 3">
@@ -17728,6 +18321,46 @@
           </a:p>
         </p:txBody>
       </p:sp>
+      <p:cxnSp>
+        <p:nvCxnSpPr>
+          <p:cNvPr id="7" name="Straight Arrow Connector 6">
+            <a:extLst>
+              <a:ext uri="{FF2B5EF4-FFF2-40B4-BE49-F238E27FC236}">
+                <a16:creationId xmlns:a16="http://schemas.microsoft.com/office/drawing/2014/main" id="{BCA09507-0FA6-76DF-6EA4-A2A0ED9F6C68}"/>
+              </a:ext>
+            </a:extLst>
+          </p:cNvPr>
+          <p:cNvCxnSpPr/>
+          <p:nvPr/>
+        </p:nvCxnSpPr>
+        <p:spPr bwMode="auto">
+          <a:xfrm>
+            <a:off x="4343400" y="2743200"/>
+            <a:ext cx="0" cy="533400"/>
+          </a:xfrm>
+          <a:prstGeom prst="straightConnector1">
+            <a:avLst/>
+          </a:prstGeom>
+          <a:ln w="41275" cmpd="tri">
+            <a:headEnd type="none" w="med" len="med"/>
+            <a:tailEnd type="triangle"/>
+          </a:ln>
+        </p:spPr>
+        <p:style>
+          <a:lnRef idx="1">
+            <a:schemeClr val="accent2"/>
+          </a:lnRef>
+          <a:fillRef idx="0">
+            <a:schemeClr val="accent2"/>
+          </a:fillRef>
+          <a:effectRef idx="0">
+            <a:schemeClr val="accent2"/>
+          </a:effectRef>
+          <a:fontRef idx="minor">
+            <a:schemeClr val="tx1"/>
+          </a:fontRef>
+        </p:style>
+      </p:cxnSp>
     </p:spTree>
     <p:extLst>
       <p:ext uri="{BB962C8B-B14F-4D97-AF65-F5344CB8AC3E}">
@@ -18106,10 +18739,10 @@
       </p:pic>
       <p:pic>
         <p:nvPicPr>
-          <p:cNvPr id="14" name="Picture 13" descr="Text&#10;&#10;Description automatically generated">
+          <p:cNvPr id="10" name="Picture 9" descr="A picture containing text&#10;&#10;Description automatically generated">
             <a:extLst>
               <a:ext uri="{FF2B5EF4-FFF2-40B4-BE49-F238E27FC236}">
-                <a16:creationId xmlns:a16="http://schemas.microsoft.com/office/drawing/2014/main" id="{94757E74-25F5-A9CD-460D-3958293282C5}"/>
+                <a16:creationId xmlns:a16="http://schemas.microsoft.com/office/drawing/2014/main" id="{D4AE0545-B9C2-C1C4-19B6-6C1C3AB46C29}"/>
               </a:ext>
             </a:extLst>
           </p:cNvPr>
@@ -18126,8 +18759,8 @@
         </p:blipFill>
         <p:spPr>
           <a:xfrm>
-            <a:off x="672912" y="3954259"/>
-            <a:ext cx="7442200" cy="1257300"/>
+            <a:off x="-12446" y="3850137"/>
+            <a:ext cx="9144000" cy="1539671"/>
           </a:xfrm>
           <a:prstGeom prst="rect">
             <a:avLst/>
@@ -18192,58 +18825,303 @@
           </a:p>
         </p:txBody>
       </p:sp>
-      <p:sp>
-        <p:nvSpPr>
-          <p:cNvPr id="3" name="Content Placeholder 2">
-            <a:extLst>
-              <a:ext uri="{FF2B5EF4-FFF2-40B4-BE49-F238E27FC236}">
-                <a16:creationId xmlns:a16="http://schemas.microsoft.com/office/drawing/2014/main" id="{648648E9-E966-0728-0BE3-28A0D12B95FC}"/>
-              </a:ext>
-            </a:extLst>
-          </p:cNvPr>
-          <p:cNvSpPr>
-            <a:spLocks noGrp="1"/>
-          </p:cNvSpPr>
-          <p:nvPr>
-            <p:ph idx="1"/>
-          </p:nvPr>
-        </p:nvSpPr>
-        <p:spPr/>
-        <p:txBody>
-          <a:bodyPr/>
-          <a:lstStyle/>
-          <a:p>
-            <a:r>
-              <a:rPr lang="en-US" dirty="0"/>
-              <a:t>For each variable X, under an initial trace T0:</a:t>
-            </a:r>
-          </a:p>
-          <a:p>
-            <a:r>
-              <a:rPr lang="en-US" dirty="0"/>
-              <a:t>execution trace T1:</a:t>
-            </a:r>
-          </a:p>
-          <a:p>
-            <a:endParaRPr lang="en-US" dirty="0"/>
-          </a:p>
-          <a:p>
-            <a:r>
-              <a:rPr lang="en-US" dirty="0"/>
-              <a:t>Count the evaluation times of X in T1 : t</a:t>
-            </a:r>
-          </a:p>
-          <a:p>
-            <a:endParaRPr lang="en-US" dirty="0"/>
-          </a:p>
-          <a:p>
-            <a:r>
-              <a:rPr lang="en-US" dirty="0"/>
-              <a:t>=&gt; Quantity for X : t</a:t>
-            </a:r>
-          </a:p>
-        </p:txBody>
-      </p:sp>
+      <mc:AlternateContent xmlns:mc="http://schemas.openxmlformats.org/markup-compatibility/2006" xmlns:a14="http://schemas.microsoft.com/office/drawing/2010/main">
+        <mc:Choice Requires="a14">
+          <p:sp>
+            <p:nvSpPr>
+              <p:cNvPr id="3" name="Content Placeholder 2">
+                <a:extLst>
+                  <a:ext uri="{FF2B5EF4-FFF2-40B4-BE49-F238E27FC236}">
+                    <a16:creationId xmlns:a16="http://schemas.microsoft.com/office/drawing/2014/main" id="{648648E9-E966-0728-0BE3-28A0D12B95FC}"/>
+                  </a:ext>
+                </a:extLst>
+              </p:cNvPr>
+              <p:cNvSpPr>
+                <a:spLocks noGrp="1"/>
+              </p:cNvSpPr>
+              <p:nvPr>
+                <p:ph idx="1"/>
+              </p:nvPr>
+            </p:nvSpPr>
+            <p:spPr/>
+            <p:txBody>
+              <a:bodyPr/>
+              <a:lstStyle/>
+              <a:p>
+                <a:r>
+                  <a:rPr lang="en-US" dirty="0"/>
+                  <a:t>Each labeled variables </a:t>
+                </a:r>
+                <a14:m>
+                  <m:oMath xmlns:m="http://schemas.openxmlformats.org/officeDocument/2006/math">
+                    <m:sSup>
+                      <m:sSupPr>
+                        <m:ctrlPr>
+                          <a:rPr lang="en-US" i="1" dirty="0">
+                            <a:latin typeface="Cambria Math" panose="02040503050406030204" pitchFamily="18" charset="0"/>
+                          </a:rPr>
+                        </m:ctrlPr>
+                      </m:sSupPr>
+                      <m:e>
+                        <m:r>
+                          <a:rPr lang="en-US" i="1" dirty="0">
+                            <a:latin typeface="Cambria Math" panose="02040503050406030204" pitchFamily="18" charset="0"/>
+                          </a:rPr>
+                          <m:t>𝑥</m:t>
+                        </m:r>
+                      </m:e>
+                      <m:sup>
+                        <m:r>
+                          <a:rPr lang="en-US" i="1" dirty="0">
+                            <a:latin typeface="Cambria Math" panose="02040503050406030204" pitchFamily="18" charset="0"/>
+                          </a:rPr>
+                          <m:t>𝑖</m:t>
+                        </m:r>
+                      </m:sup>
+                    </m:sSup>
+                  </m:oMath>
+                </a14:m>
+                <a:r>
+                  <a:rPr lang="en-US" dirty="0"/>
+                  <a:t>, w</a:t>
+                </a:r>
+                <a:r>
+                  <a:rPr lang="en-US" dirty="0" err="1"/>
+                  <a:t>.r.t.</a:t>
+                </a:r>
+                <a:r>
+                  <a:rPr lang="en-US" dirty="0"/>
+                  <a:t> an initial trace:</a:t>
+                </a:r>
+              </a:p>
+              <a:p>
+                <a:pPr marL="0" indent="0" algn="ctr">
+                  <a:buNone/>
+                </a:pPr>
+                <a:r>
+                  <a:rPr lang="en-US" dirty="0"/>
+                  <a:t>execution trace </a:t>
+                </a:r>
+                <a14:m>
+                  <m:oMath xmlns:m="http://schemas.openxmlformats.org/officeDocument/2006/math">
+                    <m:sSub>
+                      <m:sSubPr>
+                        <m:ctrlPr>
+                          <a:rPr lang="en-US" i="1">
+                            <a:latin typeface="Cambria Math" panose="02040503050406030204" pitchFamily="18" charset="0"/>
+                          </a:rPr>
+                        </m:ctrlPr>
+                      </m:sSubPr>
+                      <m:e>
+                        <m:r>
+                          <a:rPr lang="en-US" i="1">
+                            <a:latin typeface="Cambria Math" panose="02040503050406030204" pitchFamily="18" charset="0"/>
+                          </a:rPr>
+                          <m:t>𝑡</m:t>
+                        </m:r>
+                      </m:e>
+                      <m:sub>
+                        <m:r>
+                          <a:rPr lang="en-US" i="1">
+                            <a:latin typeface="Cambria Math" panose="02040503050406030204" pitchFamily="18" charset="0"/>
+                          </a:rPr>
+                          <m:t>1</m:t>
+                        </m:r>
+                      </m:sub>
+                    </m:sSub>
+                    <m:r>
+                      <a:rPr lang="en-US" i="1">
+                        <a:latin typeface="Cambria Math" panose="02040503050406030204" pitchFamily="18" charset="0"/>
+                      </a:rPr>
+                      <m:t> </m:t>
+                    </m:r>
+                  </m:oMath>
+                </a14:m>
+                <a:endParaRPr lang="en-US" dirty="0"/>
+              </a:p>
+              <a:p>
+                <a:pPr marL="0" indent="0">
+                  <a:buNone/>
+                </a:pPr>
+                <a:endParaRPr lang="en-US" dirty="0"/>
+              </a:p>
+              <a:p>
+                <a:pPr marL="0" indent="0" algn="ctr">
+                  <a:buNone/>
+                </a:pPr>
+                <a:r>
+                  <a:rPr lang="en-US" dirty="0"/>
+                  <a:t>count the evaluation times of </a:t>
+                </a:r>
+                <a14:m>
+                  <m:oMath xmlns:m="http://schemas.openxmlformats.org/officeDocument/2006/math">
+                    <m:sSup>
+                      <m:sSupPr>
+                        <m:ctrlPr>
+                          <a:rPr lang="en-US" i="1" dirty="0">
+                            <a:latin typeface="Cambria Math" panose="02040503050406030204" pitchFamily="18" charset="0"/>
+                          </a:rPr>
+                        </m:ctrlPr>
+                      </m:sSupPr>
+                      <m:e>
+                        <m:r>
+                          <a:rPr lang="en-US" i="1" dirty="0">
+                            <a:latin typeface="Cambria Math" panose="02040503050406030204" pitchFamily="18" charset="0"/>
+                          </a:rPr>
+                          <m:t>𝑥</m:t>
+                        </m:r>
+                      </m:e>
+                      <m:sup>
+                        <m:r>
+                          <a:rPr lang="en-US" i="1" dirty="0">
+                            <a:latin typeface="Cambria Math" panose="02040503050406030204" pitchFamily="18" charset="0"/>
+                          </a:rPr>
+                          <m:t>𝑖</m:t>
+                        </m:r>
+                      </m:sup>
+                    </m:sSup>
+                  </m:oMath>
+                </a14:m>
+                <a:r>
+                  <a:rPr lang="en-US" dirty="0"/>
+                  <a:t> in </a:t>
+                </a:r>
+                <a14:m>
+                  <m:oMath xmlns:m="http://schemas.openxmlformats.org/officeDocument/2006/math">
+                    <m:sSub>
+                      <m:sSubPr>
+                        <m:ctrlPr>
+                          <a:rPr lang="en-US" i="1">
+                            <a:latin typeface="Cambria Math" panose="02040503050406030204" pitchFamily="18" charset="0"/>
+                          </a:rPr>
+                        </m:ctrlPr>
+                      </m:sSubPr>
+                      <m:e>
+                        <m:r>
+                          <a:rPr lang="en-US" i="1">
+                            <a:latin typeface="Cambria Math" panose="02040503050406030204" pitchFamily="18" charset="0"/>
+                          </a:rPr>
+                          <m:t>𝑡</m:t>
+                        </m:r>
+                      </m:e>
+                      <m:sub>
+                        <m:r>
+                          <a:rPr lang="en-US" i="1">
+                            <a:latin typeface="Cambria Math" panose="02040503050406030204" pitchFamily="18" charset="0"/>
+                          </a:rPr>
+                          <m:t>1</m:t>
+                        </m:r>
+                      </m:sub>
+                    </m:sSub>
+                  </m:oMath>
+                </a14:m>
+                <a:r>
+                  <a:rPr lang="en-US" dirty="0"/>
+                  <a:t> </a:t>
+                </a:r>
+              </a:p>
+              <a:p>
+                <a:pPr marL="0" indent="0">
+                  <a:buNone/>
+                </a:pPr>
+                <a:endParaRPr lang="en-US" dirty="0"/>
+              </a:p>
+              <a:p>
+                <a:pPr marL="0" indent="0" algn="ctr">
+                  <a:buNone/>
+                </a:pPr>
+                <a:r>
+                  <a:rPr lang="en-US" dirty="0"/>
+                  <a:t>Dependency Quantity for </a:t>
+                </a:r>
+                <a14:m>
+                  <m:oMath xmlns:m="http://schemas.openxmlformats.org/officeDocument/2006/math">
+                    <m:sSup>
+                      <m:sSupPr>
+                        <m:ctrlPr>
+                          <a:rPr lang="en-US" i="1" dirty="0">
+                            <a:latin typeface="Cambria Math" panose="02040503050406030204" pitchFamily="18" charset="0"/>
+                          </a:rPr>
+                        </m:ctrlPr>
+                      </m:sSupPr>
+                      <m:e>
+                        <m:r>
+                          <a:rPr lang="en-US" i="1" dirty="0">
+                            <a:latin typeface="Cambria Math" panose="02040503050406030204" pitchFamily="18" charset="0"/>
+                          </a:rPr>
+                          <m:t>𝑥</m:t>
+                        </m:r>
+                      </m:e>
+                      <m:sup>
+                        <m:r>
+                          <a:rPr lang="en-US" i="1" dirty="0">
+                            <a:latin typeface="Cambria Math" panose="02040503050406030204" pitchFamily="18" charset="0"/>
+                          </a:rPr>
+                          <m:t>𝑖</m:t>
+                        </m:r>
+                      </m:sup>
+                    </m:sSup>
+                  </m:oMath>
+                </a14:m>
+                <a:r>
+                  <a:rPr lang="en-US" dirty="0"/>
+                  <a:t> is </a:t>
+                </a:r>
+                <a14:m>
+                  <m:oMath xmlns:m="http://schemas.openxmlformats.org/officeDocument/2006/math">
+                    <m:r>
+                      <a:rPr lang="en-US" i="1">
+                        <a:latin typeface="Cambria Math" panose="02040503050406030204" pitchFamily="18" charset="0"/>
+                      </a:rPr>
+                      <m:t>𝑤</m:t>
+                    </m:r>
+                  </m:oMath>
+                </a14:m>
+                <a:endParaRPr lang="en-US" dirty="0"/>
+              </a:p>
+            </p:txBody>
+          </p:sp>
+        </mc:Choice>
+        <mc:Fallback xmlns="">
+          <p:sp>
+            <p:nvSpPr>
+              <p:cNvPr id="3" name="Content Placeholder 2">
+                <a:extLst>
+                  <a:ext uri="{FF2B5EF4-FFF2-40B4-BE49-F238E27FC236}">
+                    <a16:creationId xmlns:a16="http://schemas.microsoft.com/office/drawing/2014/main" id="{648648E9-E966-0728-0BE3-28A0D12B95FC}"/>
+                  </a:ext>
+                </a:extLst>
+              </p:cNvPr>
+              <p:cNvSpPr>
+                <a:spLocks noGrp="1" noRot="1" noChangeAspect="1" noMove="1" noResize="1" noEditPoints="1" noAdjustHandles="1" noChangeArrowheads="1" noChangeShapeType="1" noTextEdit="1"/>
+              </p:cNvSpPr>
+              <p:nvPr>
+                <p:ph idx="1"/>
+              </p:nvPr>
+            </p:nvSpPr>
+            <p:spPr>
+              <a:blipFill>
+                <a:blip r:embed="rId2"/>
+                <a:stretch>
+                  <a:fillRect l="-1122" t="-977"/>
+                </a:stretch>
+              </a:blipFill>
+            </p:spPr>
+            <p:txBody>
+              <a:bodyPr/>
+              <a:lstStyle/>
+              <a:p>
+                <a:r>
+                  <a:rPr lang="en-US">
+                    <a:noFill/>
+                  </a:rPr>
+                  <a:t> </a:t>
+                </a:r>
+              </a:p>
+            </p:txBody>
+          </p:sp>
+        </mc:Fallback>
+      </mc:AlternateContent>
       <p:sp>
         <p:nvSpPr>
           <p:cNvPr id="4" name="Footer Placeholder 3">
@@ -18314,6 +19192,297 @@
           </a:p>
         </p:txBody>
       </p:sp>
+      <p:cxnSp>
+        <p:nvCxnSpPr>
+          <p:cNvPr id="6" name="Straight Arrow Connector 5">
+            <a:extLst>
+              <a:ext uri="{FF2B5EF4-FFF2-40B4-BE49-F238E27FC236}">
+                <a16:creationId xmlns:a16="http://schemas.microsoft.com/office/drawing/2014/main" id="{1C7FAA27-1311-21C2-5E5C-3A0FD311D2E6}"/>
+              </a:ext>
+            </a:extLst>
+          </p:cNvPr>
+          <p:cNvCxnSpPr/>
+          <p:nvPr/>
+        </p:nvCxnSpPr>
+        <p:spPr bwMode="auto">
+          <a:xfrm>
+            <a:off x="4343400" y="2743200"/>
+            <a:ext cx="0" cy="533400"/>
+          </a:xfrm>
+          <a:prstGeom prst="straightConnector1">
+            <a:avLst/>
+          </a:prstGeom>
+          <a:ln w="41275" cmpd="tri">
+            <a:headEnd type="none" w="med" len="med"/>
+            <a:tailEnd type="triangle"/>
+          </a:ln>
+        </p:spPr>
+        <p:style>
+          <a:lnRef idx="1">
+            <a:schemeClr val="accent2"/>
+          </a:lnRef>
+          <a:fillRef idx="0">
+            <a:schemeClr val="accent2"/>
+          </a:fillRef>
+          <a:effectRef idx="0">
+            <a:schemeClr val="accent2"/>
+          </a:effectRef>
+          <a:fontRef idx="minor">
+            <a:schemeClr val="tx1"/>
+          </a:fontRef>
+        </p:style>
+      </p:cxnSp>
+      <p:cxnSp>
+        <p:nvCxnSpPr>
+          <p:cNvPr id="7" name="Straight Arrow Connector 6">
+            <a:extLst>
+              <a:ext uri="{FF2B5EF4-FFF2-40B4-BE49-F238E27FC236}">
+                <a16:creationId xmlns:a16="http://schemas.microsoft.com/office/drawing/2014/main" id="{BDDD0EA6-5355-E3A3-EB2F-E3F1642BF0B3}"/>
+              </a:ext>
+            </a:extLst>
+          </p:cNvPr>
+          <p:cNvCxnSpPr/>
+          <p:nvPr/>
+        </p:nvCxnSpPr>
+        <p:spPr bwMode="auto">
+          <a:xfrm>
+            <a:off x="4340352" y="3657600"/>
+            <a:ext cx="0" cy="533400"/>
+          </a:xfrm>
+          <a:prstGeom prst="straightConnector1">
+            <a:avLst/>
+          </a:prstGeom>
+          <a:ln w="41275" cmpd="tri">
+            <a:headEnd type="none" w="med" len="med"/>
+            <a:tailEnd type="triangle"/>
+          </a:ln>
+        </p:spPr>
+        <p:style>
+          <a:lnRef idx="1">
+            <a:schemeClr val="accent2"/>
+          </a:lnRef>
+          <a:fillRef idx="0">
+            <a:schemeClr val="accent2"/>
+          </a:fillRef>
+          <a:effectRef idx="0">
+            <a:schemeClr val="accent2"/>
+          </a:effectRef>
+          <a:fontRef idx="minor">
+            <a:schemeClr val="tx1"/>
+          </a:fontRef>
+        </p:style>
+      </p:cxnSp>
+      <mc:AlternateContent xmlns:mc="http://schemas.openxmlformats.org/markup-compatibility/2006" xmlns:a14="http://schemas.microsoft.com/office/drawing/2010/main">
+        <mc:Choice Requires="a14">
+          <p:sp>
+            <p:nvSpPr>
+              <p:cNvPr id="9" name="TextBox 8">
+                <a:extLst>
+                  <a:ext uri="{FF2B5EF4-FFF2-40B4-BE49-F238E27FC236}">
+                    <a16:creationId xmlns:a16="http://schemas.microsoft.com/office/drawing/2014/main" id="{918BFDF9-41EA-0198-C6D4-A9D53018AE39}"/>
+                  </a:ext>
+                </a:extLst>
+              </p:cNvPr>
+              <p:cNvSpPr txBox="1"/>
+              <p:nvPr/>
+            </p:nvSpPr>
+            <p:spPr>
+              <a:xfrm>
+                <a:off x="4428751" y="2743200"/>
+                <a:ext cx="380994" cy="461665"/>
+              </a:xfrm>
+              <a:prstGeom prst="rect">
+                <a:avLst/>
+              </a:prstGeom>
+              <a:noFill/>
+            </p:spPr>
+            <p:txBody>
+              <a:bodyPr wrap="square">
+                <a:spAutoFit/>
+              </a:bodyPr>
+              <a:lstStyle/>
+              <a:p>
+                <a:pPr/>
+                <a14:m>
+                  <m:oMathPara xmlns:m="http://schemas.openxmlformats.org/officeDocument/2006/math">
+                    <m:oMathParaPr>
+                      <m:jc m:val="centerGroup"/>
+                    </m:oMathParaPr>
+                    <m:oMath xmlns:m="http://schemas.openxmlformats.org/officeDocument/2006/math">
+                      <m:sSub>
+                        <m:sSubPr>
+                          <m:ctrlPr>
+                            <a:rPr lang="en-US" i="1" smtClean="0">
+                              <a:latin typeface="Cambria Math" panose="02040503050406030204" pitchFamily="18" charset="0"/>
+                            </a:rPr>
+                          </m:ctrlPr>
+                        </m:sSubPr>
+                        <m:e>
+                          <m:r>
+                            <a:rPr lang="en-US" i="1">
+                              <a:latin typeface="Cambria Math" panose="02040503050406030204" pitchFamily="18" charset="0"/>
+                            </a:rPr>
+                            <m:t>𝑡</m:t>
+                          </m:r>
+                        </m:e>
+                        <m:sub>
+                          <m:r>
+                            <a:rPr lang="en-US" i="1">
+                              <a:latin typeface="Cambria Math" panose="02040503050406030204" pitchFamily="18" charset="0"/>
+                            </a:rPr>
+                            <m:t>1</m:t>
+                          </m:r>
+                        </m:sub>
+                      </m:sSub>
+                    </m:oMath>
+                  </m:oMathPara>
+                </a14:m>
+                <a:endParaRPr lang="en-US" dirty="0"/>
+              </a:p>
+            </p:txBody>
+          </p:sp>
+        </mc:Choice>
+        <mc:Fallback xmlns="">
+          <p:sp>
+            <p:nvSpPr>
+              <p:cNvPr id="9" name="TextBox 8">
+                <a:extLst>
+                  <a:ext uri="{FF2B5EF4-FFF2-40B4-BE49-F238E27FC236}">
+                    <a16:creationId xmlns:a16="http://schemas.microsoft.com/office/drawing/2014/main" id="{918BFDF9-41EA-0198-C6D4-A9D53018AE39}"/>
+                  </a:ext>
+                </a:extLst>
+              </p:cNvPr>
+              <p:cNvSpPr txBox="1">
+                <a:spLocks noRot="1" noChangeAspect="1" noMove="1" noResize="1" noEditPoints="1" noAdjustHandles="1" noChangeArrowheads="1" noChangeShapeType="1" noTextEdit="1"/>
+              </p:cNvSpPr>
+              <p:nvPr/>
+            </p:nvSpPr>
+            <p:spPr>
+              <a:xfrm>
+                <a:off x="4428751" y="2743200"/>
+                <a:ext cx="380994" cy="461665"/>
+              </a:xfrm>
+              <a:prstGeom prst="rect">
+                <a:avLst/>
+              </a:prstGeom>
+              <a:blipFill>
+                <a:blip r:embed="rId3"/>
+                <a:stretch>
+                  <a:fillRect r="-6452" b="-2703"/>
+                </a:stretch>
+              </a:blipFill>
+            </p:spPr>
+            <p:txBody>
+              <a:bodyPr/>
+              <a:lstStyle/>
+              <a:p>
+                <a:r>
+                  <a:rPr lang="en-US">
+                    <a:noFill/>
+                  </a:rPr>
+                  <a:t> </a:t>
+                </a:r>
+              </a:p>
+            </p:txBody>
+          </p:sp>
+        </mc:Fallback>
+      </mc:AlternateContent>
+      <mc:AlternateContent xmlns:mc="http://schemas.openxmlformats.org/markup-compatibility/2006" xmlns:a14="http://schemas.microsoft.com/office/drawing/2010/main">
+        <mc:Choice Requires="a14">
+          <p:sp>
+            <p:nvSpPr>
+              <p:cNvPr id="10" name="TextBox 9">
+                <a:extLst>
+                  <a:ext uri="{FF2B5EF4-FFF2-40B4-BE49-F238E27FC236}">
+                    <a16:creationId xmlns:a16="http://schemas.microsoft.com/office/drawing/2014/main" id="{4961C3D9-B05D-6ED1-C547-E322940127F0}"/>
+                  </a:ext>
+                </a:extLst>
+              </p:cNvPr>
+              <p:cNvSpPr txBox="1"/>
+              <p:nvPr/>
+            </p:nvSpPr>
+            <p:spPr>
+              <a:xfrm>
+                <a:off x="4410464" y="3657600"/>
+                <a:ext cx="380994" cy="461665"/>
+              </a:xfrm>
+              <a:prstGeom prst="rect">
+                <a:avLst/>
+              </a:prstGeom>
+              <a:noFill/>
+            </p:spPr>
+            <p:txBody>
+              <a:bodyPr wrap="square">
+                <a:spAutoFit/>
+              </a:bodyPr>
+              <a:lstStyle/>
+              <a:p>
+                <a:pPr/>
+                <a14:m>
+                  <m:oMathPara xmlns:m="http://schemas.openxmlformats.org/officeDocument/2006/math">
+                    <m:oMathParaPr>
+                      <m:jc m:val="centerGroup"/>
+                    </m:oMathParaPr>
+                    <m:oMath xmlns:m="http://schemas.openxmlformats.org/officeDocument/2006/math">
+                      <m:r>
+                        <a:rPr lang="en-US" b="0" i="1" smtClean="0">
+                          <a:latin typeface="Cambria Math" panose="02040503050406030204" pitchFamily="18" charset="0"/>
+                        </a:rPr>
+                        <m:t>𝑤</m:t>
+                      </m:r>
+                    </m:oMath>
+                  </m:oMathPara>
+                </a14:m>
+                <a:endParaRPr lang="en-US" dirty="0"/>
+              </a:p>
+            </p:txBody>
+          </p:sp>
+        </mc:Choice>
+        <mc:Fallback xmlns="">
+          <p:sp>
+            <p:nvSpPr>
+              <p:cNvPr id="10" name="TextBox 9">
+                <a:extLst>
+                  <a:ext uri="{FF2B5EF4-FFF2-40B4-BE49-F238E27FC236}">
+                    <a16:creationId xmlns:a16="http://schemas.microsoft.com/office/drawing/2014/main" id="{4961C3D9-B05D-6ED1-C547-E322940127F0}"/>
+                  </a:ext>
+                </a:extLst>
+              </p:cNvPr>
+              <p:cNvSpPr txBox="1">
+                <a:spLocks noRot="1" noChangeAspect="1" noMove="1" noResize="1" noEditPoints="1" noAdjustHandles="1" noChangeArrowheads="1" noChangeShapeType="1" noTextEdit="1"/>
+              </p:cNvSpPr>
+              <p:nvPr/>
+            </p:nvSpPr>
+            <p:spPr>
+              <a:xfrm>
+                <a:off x="4410464" y="3657600"/>
+                <a:ext cx="380994" cy="461665"/>
+              </a:xfrm>
+              <a:prstGeom prst="rect">
+                <a:avLst/>
+              </a:prstGeom>
+              <a:blipFill>
+                <a:blip r:embed="rId4"/>
+                <a:stretch>
+                  <a:fillRect/>
+                </a:stretch>
+              </a:blipFill>
+            </p:spPr>
+            <p:txBody>
+              <a:bodyPr/>
+              <a:lstStyle/>
+              <a:p>
+                <a:r>
+                  <a:rPr lang="en-US">
+                    <a:noFill/>
+                  </a:rPr>
+                  <a:t> </a:t>
+                </a:r>
+              </a:p>
+            </p:txBody>
+          </p:sp>
+        </mc:Fallback>
+      </mc:AlternateContent>
     </p:spTree>
     <p:extLst>
       <p:ext uri="{BB962C8B-B14F-4D97-AF65-F5344CB8AC3E}">
@@ -18959,221 +20128,299 @@
           </a:p>
         </p:txBody>
       </p:sp>
-      <p:sp>
-        <p:nvSpPr>
-          <p:cNvPr id="17" name="Content Placeholder 2">
-            <a:extLst>
-              <a:ext uri="{FF2B5EF4-FFF2-40B4-BE49-F238E27FC236}">
-                <a16:creationId xmlns:a16="http://schemas.microsoft.com/office/drawing/2014/main" id="{AAD7DA8F-C8E0-DE6C-9353-CD40161D20D9}"/>
-              </a:ext>
-            </a:extLst>
-          </p:cNvPr>
-          <p:cNvSpPr txBox="1">
-            <a:spLocks/>
-          </p:cNvSpPr>
-          <p:nvPr/>
-        </p:nvSpPr>
-        <p:spPr>
-          <a:xfrm>
-            <a:off x="4858385" y="3703170"/>
-            <a:ext cx="3676015" cy="498556"/>
-          </a:xfrm>
-          <a:prstGeom prst="rect">
-            <a:avLst/>
-          </a:prstGeom>
-        </p:spPr>
-        <p:txBody>
-          <a:bodyPr/>
-          <a:lstStyle>
-            <a:lvl1pPr marL="342900" indent="-342900" algn="l" rtl="0" eaLnBrk="0" fontAlgn="base" hangingPunct="0">
-              <a:spcBef>
-                <a:spcPct val="20000"/>
-              </a:spcBef>
-              <a:spcAft>
-                <a:spcPct val="0"/>
-              </a:spcAft>
-              <a:buClr>
-                <a:srgbClr val="2675B4"/>
-              </a:buClr>
-              <a:buFont typeface="Wingdings" pitchFamily="2" charset="2"/>
-              <a:buChar char="§"/>
-              <a:defRPr sz="2400" kern="1200">
-                <a:solidFill>
-                  <a:schemeClr val="tx1"/>
-                </a:solidFill>
-                <a:latin typeface="Times New Roman" panose="02020603050405020304" pitchFamily="18" charset="0"/>
-                <a:ea typeface="+mn-ea"/>
-                <a:cs typeface="Times New Roman" panose="02020603050405020304" pitchFamily="18" charset="0"/>
-              </a:defRPr>
-            </a:lvl1pPr>
-            <a:lvl2pPr marL="742950" indent="-285750" algn="l" rtl="0" eaLnBrk="0" fontAlgn="base" hangingPunct="0">
-              <a:spcBef>
-                <a:spcPct val="20000"/>
-              </a:spcBef>
-              <a:spcAft>
-                <a:spcPct val="0"/>
-              </a:spcAft>
-              <a:buClr>
-                <a:srgbClr val="2675B4"/>
-              </a:buClr>
-              <a:buFont typeface="Wingdings" pitchFamily="2" charset="2"/>
-              <a:buChar char="§"/>
-              <a:defRPr kern="1200">
-                <a:solidFill>
-                  <a:schemeClr val="tx1"/>
-                </a:solidFill>
-                <a:latin typeface="Times New Roman" panose="02020603050405020304" pitchFamily="18" charset="0"/>
-                <a:ea typeface="+mn-ea"/>
-                <a:cs typeface="Times New Roman" panose="02020603050405020304" pitchFamily="18" charset="0"/>
-              </a:defRPr>
-            </a:lvl2pPr>
-            <a:lvl3pPr marL="1143000" indent="-228600" algn="l" rtl="0" eaLnBrk="0" fontAlgn="base" hangingPunct="0">
-              <a:spcBef>
-                <a:spcPct val="20000"/>
-              </a:spcBef>
-              <a:spcAft>
-                <a:spcPct val="0"/>
-              </a:spcAft>
-              <a:buClr>
-                <a:srgbClr val="2675B4"/>
-              </a:buClr>
-              <a:buFont typeface="Wingdings" pitchFamily="2" charset="2"/>
-              <a:buChar char="§"/>
-              <a:defRPr kern="1200">
-                <a:solidFill>
-                  <a:schemeClr val="tx1"/>
-                </a:solidFill>
-                <a:latin typeface="Times New Roman" panose="02020603050405020304" pitchFamily="18" charset="0"/>
-                <a:ea typeface="+mn-ea"/>
-                <a:cs typeface="Times New Roman" panose="02020603050405020304" pitchFamily="18" charset="0"/>
-              </a:defRPr>
-            </a:lvl3pPr>
-            <a:lvl4pPr marL="1600200" indent="-228600" algn="l" rtl="0" eaLnBrk="0" fontAlgn="base" hangingPunct="0">
-              <a:spcBef>
-                <a:spcPct val="20000"/>
-              </a:spcBef>
-              <a:spcAft>
-                <a:spcPct val="0"/>
-              </a:spcAft>
-              <a:buClr>
-                <a:srgbClr val="2675B4"/>
-              </a:buClr>
-              <a:buFont typeface="Wingdings" pitchFamily="2" charset="2"/>
-              <a:buChar char="§"/>
-              <a:defRPr kern="1200">
-                <a:solidFill>
-                  <a:schemeClr val="tx1"/>
-                </a:solidFill>
-                <a:latin typeface="Times New Roman" panose="02020603050405020304" pitchFamily="18" charset="0"/>
-                <a:ea typeface="+mn-ea"/>
-                <a:cs typeface="Times New Roman" panose="02020603050405020304" pitchFamily="18" charset="0"/>
-              </a:defRPr>
-            </a:lvl4pPr>
-            <a:lvl5pPr marL="2057400" indent="-228600" algn="l" rtl="0" eaLnBrk="0" fontAlgn="base" hangingPunct="0">
-              <a:spcBef>
-                <a:spcPct val="20000"/>
-              </a:spcBef>
-              <a:spcAft>
-                <a:spcPct val="0"/>
-              </a:spcAft>
-              <a:buClr>
-                <a:srgbClr val="2675B4"/>
-              </a:buClr>
-              <a:buFont typeface="Wingdings" pitchFamily="2" charset="2"/>
-              <a:buChar char="§"/>
-              <a:defRPr kern="1200">
-                <a:solidFill>
-                  <a:schemeClr val="tx1"/>
-                </a:solidFill>
-                <a:latin typeface="Times New Roman" panose="02020603050405020304" pitchFamily="18" charset="0"/>
-                <a:ea typeface="+mn-ea"/>
-                <a:cs typeface="Times New Roman" panose="02020603050405020304" pitchFamily="18" charset="0"/>
-              </a:defRPr>
-            </a:lvl5pPr>
-            <a:lvl6pPr marL="2514600" indent="-228600" algn="l" defTabSz="914400" rtl="0" eaLnBrk="1" latinLnBrk="0" hangingPunct="1">
-              <a:lnSpc>
-                <a:spcPct val="90000"/>
-              </a:lnSpc>
-              <a:spcBef>
-                <a:spcPts val="500"/>
-              </a:spcBef>
-              <a:buFont typeface="Arial"/>
-              <a:buChar char="•"/>
-              <a:defRPr sz="1800" kern="1200">
-                <a:solidFill>
-                  <a:schemeClr val="tx1"/>
-                </a:solidFill>
-                <a:latin typeface="+mn-lt"/>
-                <a:ea typeface="+mn-ea"/>
-                <a:cs typeface="+mn-cs"/>
-              </a:defRPr>
-            </a:lvl6pPr>
-            <a:lvl7pPr marL="2971800" indent="-228600" algn="l" defTabSz="914400" rtl="0" eaLnBrk="1" latinLnBrk="0" hangingPunct="1">
-              <a:lnSpc>
-                <a:spcPct val="90000"/>
-              </a:lnSpc>
-              <a:spcBef>
-                <a:spcPts val="500"/>
-              </a:spcBef>
-              <a:buFont typeface="Arial"/>
-              <a:buChar char="•"/>
-              <a:defRPr sz="1800" kern="1200">
-                <a:solidFill>
-                  <a:schemeClr val="tx1"/>
-                </a:solidFill>
-                <a:latin typeface="+mn-lt"/>
-                <a:ea typeface="+mn-ea"/>
-                <a:cs typeface="+mn-cs"/>
-              </a:defRPr>
-            </a:lvl7pPr>
-            <a:lvl8pPr marL="3429000" indent="-228600" algn="l" defTabSz="914400" rtl="0" eaLnBrk="1" latinLnBrk="0" hangingPunct="1">
-              <a:lnSpc>
-                <a:spcPct val="90000"/>
-              </a:lnSpc>
-              <a:spcBef>
-                <a:spcPts val="500"/>
-              </a:spcBef>
-              <a:buFont typeface="Arial"/>
-              <a:buChar char="•"/>
-              <a:defRPr sz="1800" kern="1200">
-                <a:solidFill>
-                  <a:schemeClr val="tx1"/>
-                </a:solidFill>
-                <a:latin typeface="+mn-lt"/>
-                <a:ea typeface="+mn-ea"/>
-                <a:cs typeface="+mn-cs"/>
-              </a:defRPr>
-            </a:lvl8pPr>
-            <a:lvl9pPr marL="3886200" indent="-228600" algn="l" defTabSz="914400" rtl="0" eaLnBrk="1" latinLnBrk="0" hangingPunct="1">
-              <a:lnSpc>
-                <a:spcPct val="90000"/>
-              </a:lnSpc>
-              <a:spcBef>
-                <a:spcPts val="500"/>
-              </a:spcBef>
-              <a:buFont typeface="Arial"/>
-              <a:buChar char="•"/>
-              <a:defRPr sz="1800" kern="1200">
-                <a:solidFill>
-                  <a:schemeClr val="tx1"/>
-                </a:solidFill>
-                <a:latin typeface="+mn-lt"/>
-                <a:ea typeface="+mn-ea"/>
-                <a:cs typeface="+mn-cs"/>
-              </a:defRPr>
-            </a:lvl9pPr>
-          </a:lstStyle>
-          <a:p>
-            <a:pPr marL="0" indent="0">
-              <a:buNone/>
-            </a:pPr>
-            <a:r>
-              <a:rPr lang="en-US" dirty="0"/>
-              <a:t>arbitrary initial trace t0</a:t>
-            </a:r>
-          </a:p>
-        </p:txBody>
-      </p:sp>
+      <mc:AlternateContent xmlns:mc="http://schemas.openxmlformats.org/markup-compatibility/2006" xmlns:a14="http://schemas.microsoft.com/office/drawing/2010/main">
+        <mc:Choice Requires="a14">
+          <p:sp>
+            <p:nvSpPr>
+              <p:cNvPr id="17" name="Content Placeholder 2">
+                <a:extLst>
+                  <a:ext uri="{FF2B5EF4-FFF2-40B4-BE49-F238E27FC236}">
+                    <a16:creationId xmlns:a16="http://schemas.microsoft.com/office/drawing/2014/main" id="{AAD7DA8F-C8E0-DE6C-9353-CD40161D20D9}"/>
+                  </a:ext>
+                </a:extLst>
+              </p:cNvPr>
+              <p:cNvSpPr txBox="1">
+                <a:spLocks/>
+              </p:cNvSpPr>
+              <p:nvPr/>
+            </p:nvSpPr>
+            <p:spPr>
+              <a:xfrm>
+                <a:off x="4858385" y="3703170"/>
+                <a:ext cx="3676015" cy="498556"/>
+              </a:xfrm>
+              <a:prstGeom prst="rect">
+                <a:avLst/>
+              </a:prstGeom>
+            </p:spPr>
+            <p:txBody>
+              <a:bodyPr/>
+              <a:lstStyle>
+                <a:lvl1pPr marL="342900" indent="-342900" algn="l" rtl="0" eaLnBrk="0" fontAlgn="base" hangingPunct="0">
+                  <a:spcBef>
+                    <a:spcPct val="20000"/>
+                  </a:spcBef>
+                  <a:spcAft>
+                    <a:spcPct val="0"/>
+                  </a:spcAft>
+                  <a:buClr>
+                    <a:srgbClr val="2675B4"/>
+                  </a:buClr>
+                  <a:buFont typeface="Wingdings" pitchFamily="2" charset="2"/>
+                  <a:buChar char="§"/>
+                  <a:defRPr sz="2400" kern="1200">
+                    <a:solidFill>
+                      <a:schemeClr val="tx1"/>
+                    </a:solidFill>
+                    <a:latin typeface="Times New Roman" panose="02020603050405020304" pitchFamily="18" charset="0"/>
+                    <a:ea typeface="+mn-ea"/>
+                    <a:cs typeface="Times New Roman" panose="02020603050405020304" pitchFamily="18" charset="0"/>
+                  </a:defRPr>
+                </a:lvl1pPr>
+                <a:lvl2pPr marL="742950" indent="-285750" algn="l" rtl="0" eaLnBrk="0" fontAlgn="base" hangingPunct="0">
+                  <a:spcBef>
+                    <a:spcPct val="20000"/>
+                  </a:spcBef>
+                  <a:spcAft>
+                    <a:spcPct val="0"/>
+                  </a:spcAft>
+                  <a:buClr>
+                    <a:srgbClr val="2675B4"/>
+                  </a:buClr>
+                  <a:buFont typeface="Wingdings" pitchFamily="2" charset="2"/>
+                  <a:buChar char="§"/>
+                  <a:defRPr kern="1200">
+                    <a:solidFill>
+                      <a:schemeClr val="tx1"/>
+                    </a:solidFill>
+                    <a:latin typeface="Times New Roman" panose="02020603050405020304" pitchFamily="18" charset="0"/>
+                    <a:ea typeface="+mn-ea"/>
+                    <a:cs typeface="Times New Roman" panose="02020603050405020304" pitchFamily="18" charset="0"/>
+                  </a:defRPr>
+                </a:lvl2pPr>
+                <a:lvl3pPr marL="1143000" indent="-228600" algn="l" rtl="0" eaLnBrk="0" fontAlgn="base" hangingPunct="0">
+                  <a:spcBef>
+                    <a:spcPct val="20000"/>
+                  </a:spcBef>
+                  <a:spcAft>
+                    <a:spcPct val="0"/>
+                  </a:spcAft>
+                  <a:buClr>
+                    <a:srgbClr val="2675B4"/>
+                  </a:buClr>
+                  <a:buFont typeface="Wingdings" pitchFamily="2" charset="2"/>
+                  <a:buChar char="§"/>
+                  <a:defRPr kern="1200">
+                    <a:solidFill>
+                      <a:schemeClr val="tx1"/>
+                    </a:solidFill>
+                    <a:latin typeface="Times New Roman" panose="02020603050405020304" pitchFamily="18" charset="0"/>
+                    <a:ea typeface="+mn-ea"/>
+                    <a:cs typeface="Times New Roman" panose="02020603050405020304" pitchFamily="18" charset="0"/>
+                  </a:defRPr>
+                </a:lvl3pPr>
+                <a:lvl4pPr marL="1600200" indent="-228600" algn="l" rtl="0" eaLnBrk="0" fontAlgn="base" hangingPunct="0">
+                  <a:spcBef>
+                    <a:spcPct val="20000"/>
+                  </a:spcBef>
+                  <a:spcAft>
+                    <a:spcPct val="0"/>
+                  </a:spcAft>
+                  <a:buClr>
+                    <a:srgbClr val="2675B4"/>
+                  </a:buClr>
+                  <a:buFont typeface="Wingdings" pitchFamily="2" charset="2"/>
+                  <a:buChar char="§"/>
+                  <a:defRPr kern="1200">
+                    <a:solidFill>
+                      <a:schemeClr val="tx1"/>
+                    </a:solidFill>
+                    <a:latin typeface="Times New Roman" panose="02020603050405020304" pitchFamily="18" charset="0"/>
+                    <a:ea typeface="+mn-ea"/>
+                    <a:cs typeface="Times New Roman" panose="02020603050405020304" pitchFamily="18" charset="0"/>
+                  </a:defRPr>
+                </a:lvl4pPr>
+                <a:lvl5pPr marL="2057400" indent="-228600" algn="l" rtl="0" eaLnBrk="0" fontAlgn="base" hangingPunct="0">
+                  <a:spcBef>
+                    <a:spcPct val="20000"/>
+                  </a:spcBef>
+                  <a:spcAft>
+                    <a:spcPct val="0"/>
+                  </a:spcAft>
+                  <a:buClr>
+                    <a:srgbClr val="2675B4"/>
+                  </a:buClr>
+                  <a:buFont typeface="Wingdings" pitchFamily="2" charset="2"/>
+                  <a:buChar char="§"/>
+                  <a:defRPr kern="1200">
+                    <a:solidFill>
+                      <a:schemeClr val="tx1"/>
+                    </a:solidFill>
+                    <a:latin typeface="Times New Roman" panose="02020603050405020304" pitchFamily="18" charset="0"/>
+                    <a:ea typeface="+mn-ea"/>
+                    <a:cs typeface="Times New Roman" panose="02020603050405020304" pitchFamily="18" charset="0"/>
+                  </a:defRPr>
+                </a:lvl5pPr>
+                <a:lvl6pPr marL="2514600" indent="-228600" algn="l" defTabSz="914400" rtl="0" eaLnBrk="1" latinLnBrk="0" hangingPunct="1">
+                  <a:lnSpc>
+                    <a:spcPct val="90000"/>
+                  </a:lnSpc>
+                  <a:spcBef>
+                    <a:spcPts val="500"/>
+                  </a:spcBef>
+                  <a:buFont typeface="Arial"/>
+                  <a:buChar char="•"/>
+                  <a:defRPr sz="1800" kern="1200">
+                    <a:solidFill>
+                      <a:schemeClr val="tx1"/>
+                    </a:solidFill>
+                    <a:latin typeface="+mn-lt"/>
+                    <a:ea typeface="+mn-ea"/>
+                    <a:cs typeface="+mn-cs"/>
+                  </a:defRPr>
+                </a:lvl6pPr>
+                <a:lvl7pPr marL="2971800" indent="-228600" algn="l" defTabSz="914400" rtl="0" eaLnBrk="1" latinLnBrk="0" hangingPunct="1">
+                  <a:lnSpc>
+                    <a:spcPct val="90000"/>
+                  </a:lnSpc>
+                  <a:spcBef>
+                    <a:spcPts val="500"/>
+                  </a:spcBef>
+                  <a:buFont typeface="Arial"/>
+                  <a:buChar char="•"/>
+                  <a:defRPr sz="1800" kern="1200">
+                    <a:solidFill>
+                      <a:schemeClr val="tx1"/>
+                    </a:solidFill>
+                    <a:latin typeface="+mn-lt"/>
+                    <a:ea typeface="+mn-ea"/>
+                    <a:cs typeface="+mn-cs"/>
+                  </a:defRPr>
+                </a:lvl7pPr>
+                <a:lvl8pPr marL="3429000" indent="-228600" algn="l" defTabSz="914400" rtl="0" eaLnBrk="1" latinLnBrk="0" hangingPunct="1">
+                  <a:lnSpc>
+                    <a:spcPct val="90000"/>
+                  </a:lnSpc>
+                  <a:spcBef>
+                    <a:spcPts val="500"/>
+                  </a:spcBef>
+                  <a:buFont typeface="Arial"/>
+                  <a:buChar char="•"/>
+                  <a:defRPr sz="1800" kern="1200">
+                    <a:solidFill>
+                      <a:schemeClr val="tx1"/>
+                    </a:solidFill>
+                    <a:latin typeface="+mn-lt"/>
+                    <a:ea typeface="+mn-ea"/>
+                    <a:cs typeface="+mn-cs"/>
+                  </a:defRPr>
+                </a:lvl8pPr>
+                <a:lvl9pPr marL="3886200" indent="-228600" algn="l" defTabSz="914400" rtl="0" eaLnBrk="1" latinLnBrk="0" hangingPunct="1">
+                  <a:lnSpc>
+                    <a:spcPct val="90000"/>
+                  </a:lnSpc>
+                  <a:spcBef>
+                    <a:spcPts val="500"/>
+                  </a:spcBef>
+                  <a:buFont typeface="Arial"/>
+                  <a:buChar char="•"/>
+                  <a:defRPr sz="1800" kern="1200">
+                    <a:solidFill>
+                      <a:schemeClr val="tx1"/>
+                    </a:solidFill>
+                    <a:latin typeface="+mn-lt"/>
+                    <a:ea typeface="+mn-ea"/>
+                    <a:cs typeface="+mn-cs"/>
+                  </a:defRPr>
+                </a:lvl9pPr>
+              </a:lstStyle>
+              <a:p>
+                <a:pPr marL="0" indent="0">
+                  <a:buNone/>
+                </a:pPr>
+                <a:r>
+                  <a:rPr lang="en-US" dirty="0"/>
+                  <a:t>arbitrary initial trace </a:t>
+                </a:r>
+                <a14:m>
+                  <m:oMath xmlns:m="http://schemas.openxmlformats.org/officeDocument/2006/math">
+                    <m:sSub>
+                      <m:sSubPr>
+                        <m:ctrlPr>
+                          <a:rPr lang="en-US" i="1">
+                            <a:latin typeface="Cambria Math" panose="02040503050406030204" pitchFamily="18" charset="0"/>
+                          </a:rPr>
+                        </m:ctrlPr>
+                      </m:sSubPr>
+                      <m:e>
+                        <m:r>
+                          <a:rPr lang="en-US" i="1">
+                            <a:latin typeface="Cambria Math" panose="02040503050406030204" pitchFamily="18" charset="0"/>
+                          </a:rPr>
+                          <m:t>𝑡</m:t>
+                        </m:r>
+                      </m:e>
+                      <m:sub>
+                        <m:r>
+                          <a:rPr lang="en-US" b="0" i="1" smtClean="0">
+                            <a:latin typeface="Cambria Math" panose="02040503050406030204" pitchFamily="18" charset="0"/>
+                          </a:rPr>
+                          <m:t>0</m:t>
+                        </m:r>
+                      </m:sub>
+                    </m:sSub>
+                  </m:oMath>
+                </a14:m>
+                <a:endParaRPr lang="en-US" dirty="0"/>
+              </a:p>
+            </p:txBody>
+          </p:sp>
+        </mc:Choice>
+        <mc:Fallback xmlns="">
+          <p:sp>
+            <p:nvSpPr>
+              <p:cNvPr id="17" name="Content Placeholder 2">
+                <a:extLst>
+                  <a:ext uri="{FF2B5EF4-FFF2-40B4-BE49-F238E27FC236}">
+                    <a16:creationId xmlns:a16="http://schemas.microsoft.com/office/drawing/2014/main" id="{AAD7DA8F-C8E0-DE6C-9353-CD40161D20D9}"/>
+                  </a:ext>
+                </a:extLst>
+              </p:cNvPr>
+              <p:cNvSpPr txBox="1">
+                <a:spLocks noRot="1" noChangeAspect="1" noMove="1" noResize="1" noEditPoints="1" noAdjustHandles="1" noChangeArrowheads="1" noChangeShapeType="1" noTextEdit="1"/>
+              </p:cNvSpPr>
+              <p:nvPr/>
+            </p:nvSpPr>
+            <p:spPr>
+              <a:xfrm>
+                <a:off x="4858385" y="3703170"/>
+                <a:ext cx="3676015" cy="498556"/>
+              </a:xfrm>
+              <a:prstGeom prst="rect">
+                <a:avLst/>
+              </a:prstGeom>
+              <a:blipFill>
+                <a:blip r:embed="rId5"/>
+                <a:stretch>
+                  <a:fillRect l="-2759" t="-10000" b="-20000"/>
+                </a:stretch>
+              </a:blipFill>
+            </p:spPr>
+            <p:txBody>
+              <a:bodyPr/>
+              <a:lstStyle/>
+              <a:p>
+                <a:r>
+                  <a:rPr lang="en-US">
+                    <a:noFill/>
+                  </a:rPr>
+                  <a:t> </a:t>
+                </a:r>
+              </a:p>
+            </p:txBody>
+          </p:sp>
+        </mc:Fallback>
+      </mc:AlternateContent>
     </p:spTree>
     <p:extLst>
       <p:ext uri="{BB962C8B-B14F-4D97-AF65-F5344CB8AC3E}">
@@ -19264,28 +20511,66 @@
           <a:p>
             <a:r>
               <a:rPr lang="en-US" dirty="0"/>
-              <a:t>Vertices: Variable</a:t>
+              <a:t>vertex V(c) := </a:t>
+            </a:r>
+            <a:r>
+              <a:rPr lang="en-US" sz="2200" dirty="0"/>
+              <a:t>Labeled Variables for c</a:t>
             </a:r>
           </a:p>
           <a:p>
             <a:r>
               <a:rPr lang="en-US" dirty="0"/>
-              <a:t>Edge : Dependency Relation </a:t>
+              <a:t>edge E(c) := </a:t>
+            </a:r>
+            <a:r>
+              <a:rPr lang="en-US" sz="2200" b="1" i="1" dirty="0"/>
+              <a:t>Dependency Relation </a:t>
+            </a:r>
+            <a:r>
+              <a:rPr lang="en-US" sz="2200" dirty="0"/>
+              <a:t>for pair of labeled variables </a:t>
             </a:r>
           </a:p>
           <a:p>
             <a:r>
               <a:rPr lang="en-US" dirty="0"/>
-              <a:t>Weights : Dependency Quantity</a:t>
+              <a:t>weight W(c):= </a:t>
+            </a:r>
+            <a:r>
+              <a:rPr lang="en-US" sz="2200" b="1" i="1" dirty="0"/>
+              <a:t>Dependency Quantity </a:t>
+            </a:r>
+            <a:r>
+              <a:rPr lang="en-US" sz="2200" dirty="0"/>
+              <a:t>for each labeled variable</a:t>
             </a:r>
           </a:p>
           <a:p>
             <a:r>
               <a:rPr lang="en-US" dirty="0"/>
-              <a:t>Query Annotations: Track Query Requests.</a:t>
-            </a:r>
-          </a:p>
-          <a:p>
+              <a:t>query annotation Q(c) := </a:t>
+            </a:r>
+            <a:r>
+              <a:rPr lang="en-US" sz="2200" dirty="0"/>
+              <a:t>labeled variables assigned by </a:t>
+            </a:r>
+            <a:r>
+              <a:rPr lang="en-US" sz="2200" b="1" i="1" dirty="0"/>
+              <a:t>query requests</a:t>
+            </a:r>
+            <a:r>
+              <a:rPr lang="en-US" dirty="0"/>
+              <a:t>.</a:t>
+            </a:r>
+          </a:p>
+          <a:p>
+            <a:endParaRPr lang="en-US" dirty="0"/>
+          </a:p>
+          <a:p>
+            <a:pPr marL="0" indent="0" algn="ctr">
+              <a:buNone/>
+            </a:pPr>
             <a:r>
               <a:rPr lang="en-US" dirty="0"/>
               <a:t>G(c) = (V(c), E(c), W(c), Q(c))</a:t>
@@ -20951,7 +22236,7 @@
           <a:p>
             <a:pPr lvl="1"/>
             <a:r>
-              <a:rPr lang="en-US" b="1" dirty="0">
+              <a:rPr lang="en-US" b="1" i="1" dirty="0">
                 <a:solidFill>
                   <a:srgbClr val="C00000"/>
                 </a:solidFill>
@@ -20959,7 +22244,7 @@
               <a:t># {vi | vi \in  (v0, …, </a:t>
             </a:r>
             <a:r>
-              <a:rPr lang="en-US" b="1" dirty="0" err="1">
+              <a:rPr lang="en-US" b="1" i="1" dirty="0" err="1">
                 <a:solidFill>
                   <a:srgbClr val="C00000"/>
                 </a:solidFill>
@@ -20967,7 +22252,7 @@
               <a:t>vn</a:t>
             </a:r>
             <a:r>
-              <a:rPr lang="en-US" b="1" dirty="0">
+              <a:rPr lang="en-US" b="1" i="1" dirty="0">
                 <a:solidFill>
                   <a:srgbClr val="C00000"/>
                 </a:solidFill>
@@ -21708,6 +22993,46 @@
           </a:p>
         </p:txBody>
       </p:sp>
+      <p:cxnSp>
+        <p:nvCxnSpPr>
+          <p:cNvPr id="7" name="Straight Arrow Connector 6">
+            <a:extLst>
+              <a:ext uri="{FF2B5EF4-FFF2-40B4-BE49-F238E27FC236}">
+                <a16:creationId xmlns:a16="http://schemas.microsoft.com/office/drawing/2014/main" id="{089F9457-588E-606E-3B03-8873B0E7E468}"/>
+              </a:ext>
+            </a:extLst>
+          </p:cNvPr>
+          <p:cNvCxnSpPr/>
+          <p:nvPr/>
+        </p:nvCxnSpPr>
+        <p:spPr bwMode="auto">
+          <a:xfrm>
+            <a:off x="4343400" y="3276600"/>
+            <a:ext cx="0" cy="533400"/>
+          </a:xfrm>
+          <a:prstGeom prst="straightConnector1">
+            <a:avLst/>
+          </a:prstGeom>
+          <a:ln w="41275" cmpd="tri">
+            <a:headEnd type="none" w="med" len="med"/>
+            <a:tailEnd type="triangle"/>
+          </a:ln>
+        </p:spPr>
+        <p:style>
+          <a:lnRef idx="1">
+            <a:schemeClr val="accent2"/>
+          </a:lnRef>
+          <a:fillRef idx="0">
+            <a:schemeClr val="accent2"/>
+          </a:fillRef>
+          <a:effectRef idx="0">
+            <a:schemeClr val="accent2"/>
+          </a:effectRef>
+          <a:fontRef idx="minor">
+            <a:schemeClr val="tx1"/>
+          </a:fontRef>
+        </p:style>
+      </p:cxnSp>
     </p:spTree>
     <p:extLst>
       <p:ext uri="{BB962C8B-B14F-4D97-AF65-F5344CB8AC3E}">
@@ -22601,39 +23926,56 @@
             </a:r>
           </a:p>
           <a:p>
+            <a:r>
+              <a:rPr lang="en-US" dirty="0"/>
+              <a:t>vertex := Labeled Variables in c</a:t>
+            </a:r>
+          </a:p>
+          <a:p>
+            <a:r>
+              <a:rPr lang="en-US" dirty="0"/>
+              <a:t>edge := </a:t>
+            </a:r>
+            <a:r>
+              <a:rPr lang="en-US" b="1" i="1" dirty="0"/>
+              <a:t>Feasible Data Flow Relation </a:t>
+            </a:r>
+          </a:p>
+          <a:p>
+            <a:r>
+              <a:rPr lang="en-US" dirty="0"/>
+              <a:t>weight := </a:t>
+            </a:r>
+            <a:r>
+              <a:rPr lang="en-US" b="1" i="1" dirty="0"/>
+              <a:t>Reachability Bound </a:t>
+            </a:r>
+            <a:r>
+              <a:rPr lang="en-US" dirty="0"/>
+              <a:t>for each labeled variable</a:t>
+            </a:r>
+          </a:p>
+          <a:p>
+            <a:r>
+              <a:rPr lang="en-US" dirty="0"/>
+              <a:t>query annotation := labeled variables assigned by </a:t>
+            </a:r>
+            <a:r>
+              <a:rPr lang="en-US" b="1" i="1" dirty="0"/>
+              <a:t>query requests</a:t>
+            </a:r>
+            <a:r>
+              <a:rPr lang="en-US" dirty="0"/>
+              <a:t>.</a:t>
+            </a:r>
+          </a:p>
+          <a:p>
             <a:endParaRPr lang="en-US" dirty="0"/>
           </a:p>
           <a:p>
             <a:r>
               <a:rPr lang="en-US" dirty="0"/>
-              <a:t>Vertices: Variable</a:t>
-            </a:r>
-          </a:p>
-          <a:p>
-            <a:r>
-              <a:rPr lang="en-US" dirty="0"/>
-              <a:t>Edge : Feasible Data Flow Relation </a:t>
-            </a:r>
-          </a:p>
-          <a:p>
-            <a:r>
-              <a:rPr lang="en-US" dirty="0"/>
-              <a:t>Weights : Reachability Bound</a:t>
-            </a:r>
-          </a:p>
-          <a:p>
-            <a:r>
-              <a:rPr lang="en-US" dirty="0"/>
-              <a:t>Query Annotations: Track Query Requests.</a:t>
-            </a:r>
-          </a:p>
-          <a:p>
-            <a:endParaRPr lang="en-US" dirty="0"/>
-          </a:p>
-          <a:p>
-            <a:r>
-              <a:rPr lang="en-US" dirty="0"/>
-              <a:t>Step 2 – Longest Finite Walk</a:t>
+              <a:t>Step 2 – Longest Finite Walk Estimation</a:t>
             </a:r>
           </a:p>
         </p:txBody>
@@ -26332,122 +27674,324 @@
           </a:p>
         </p:txBody>
       </p:sp>
-      <p:sp>
-        <p:nvSpPr>
-          <p:cNvPr id="3" name="Content Placeholder 2">
-            <a:extLst>
-              <a:ext uri="{FF2B5EF4-FFF2-40B4-BE49-F238E27FC236}">
-                <a16:creationId xmlns:a16="http://schemas.microsoft.com/office/drawing/2014/main" id="{0FB22D9F-8FC0-8C72-5617-8C69B9E65AEA}"/>
-              </a:ext>
-            </a:extLst>
-          </p:cNvPr>
-          <p:cNvSpPr>
-            <a:spLocks noGrp="1"/>
-          </p:cNvSpPr>
-          <p:nvPr>
-            <p:ph idx="1"/>
-          </p:nvPr>
-        </p:nvSpPr>
-        <p:spPr/>
-        <p:txBody>
-          <a:bodyPr/>
-          <a:lstStyle/>
-          <a:p>
-            <a:r>
-              <a:rPr lang="en-US" dirty="0"/>
-              <a:t>Existing Analysis Methodology:</a:t>
-            </a:r>
-          </a:p>
-          <a:p>
-            <a:r>
-              <a:rPr lang="en-US" dirty="0"/>
-              <a:t>Type-Based</a:t>
-            </a:r>
-          </a:p>
-          <a:p>
-            <a:r>
-              <a:rPr lang="en-US" dirty="0"/>
-              <a:t>data-flow/control-flow analysis based </a:t>
-            </a:r>
-          </a:p>
-          <a:p>
-            <a:r>
-              <a:rPr lang="en-US" dirty="0"/>
-              <a:t>Both are worst case estimation</a:t>
-            </a:r>
-          </a:p>
-          <a:p>
-            <a:endParaRPr lang="en-US" dirty="0"/>
-          </a:p>
-          <a:p>
-            <a:r>
-              <a:rPr lang="en-US" dirty="0"/>
-              <a:t>Existing Analysis Results:</a:t>
-            </a:r>
-          </a:p>
-          <a:p>
-            <a:r>
-              <a:rPr lang="en-US" b="1" dirty="0">
-                <a:solidFill>
-                  <a:srgbClr val="C00000"/>
-                </a:solidFill>
-              </a:rPr>
-              <a:t>a </a:t>
-            </a:r>
-            <a:r>
-              <a:rPr lang="en-US" b="1" dirty="0">
-                <a:solidFill>
-                  <a:srgbClr val="C00000"/>
-                </a:solidFill>
-                <a:sym typeface="Wingdings" pitchFamily="2" charset="2"/>
-              </a:rPr>
-              <a:t> 1 </a:t>
-            </a:r>
-            <a:r>
-              <a:rPr lang="en-US" b="1" dirty="0">
-                <a:solidFill>
-                  <a:srgbClr val="C00000"/>
-                </a:solidFill>
-              </a:rPr>
-              <a:t>,  x </a:t>
-            </a:r>
-            <a:r>
-              <a:rPr lang="en-US" b="1" dirty="0">
-                <a:solidFill>
-                  <a:srgbClr val="C00000"/>
-                </a:solidFill>
-                <a:sym typeface="Wingdings" pitchFamily="2" charset="2"/>
-              </a:rPr>
-              <a:t></a:t>
-            </a:r>
-            <a:r>
-              <a:rPr lang="en-US" b="1" dirty="0">
-                <a:solidFill>
-                  <a:srgbClr val="C00000"/>
-                </a:solidFill>
-              </a:rPr>
-              <a:t> k </a:t>
-            </a:r>
-            <a:r>
-              <a:rPr lang="en-US" b="1" dirty="0">
-                <a:solidFill>
-                  <a:srgbClr val="C00000"/>
-                </a:solidFill>
-                <a:sym typeface="Wingdings" pitchFamily="2" charset="2"/>
-              </a:rPr>
-              <a:t>,  l  </a:t>
-            </a:r>
-            <a:r>
-              <a:rPr lang="en-US" b="1" dirty="0">
-                <a:solidFill>
-                  <a:srgbClr val="C00000"/>
-                </a:solidFill>
-              </a:rPr>
-              <a:t>k * k</a:t>
-            </a:r>
-          </a:p>
-        </p:txBody>
-      </p:sp>
+      <mc:AlternateContent xmlns:mc="http://schemas.openxmlformats.org/markup-compatibility/2006" xmlns:a14="http://schemas.microsoft.com/office/drawing/2010/main">
+        <mc:Choice Requires="a14">
+          <p:sp>
+            <p:nvSpPr>
+              <p:cNvPr id="3" name="Content Placeholder 2">
+                <a:extLst>
+                  <a:ext uri="{FF2B5EF4-FFF2-40B4-BE49-F238E27FC236}">
+                    <a16:creationId xmlns:a16="http://schemas.microsoft.com/office/drawing/2014/main" id="{0FB22D9F-8FC0-8C72-5617-8C69B9E65AEA}"/>
+                  </a:ext>
+                </a:extLst>
+              </p:cNvPr>
+              <p:cNvSpPr>
+                <a:spLocks noGrp="1"/>
+              </p:cNvSpPr>
+              <p:nvPr>
+                <p:ph idx="1"/>
+              </p:nvPr>
+            </p:nvSpPr>
+            <p:spPr/>
+            <p:txBody>
+              <a:bodyPr/>
+              <a:lstStyle/>
+              <a:p>
+                <a:r>
+                  <a:rPr lang="en-US" dirty="0"/>
+                  <a:t>Existing Analysis Methodology:</a:t>
+                </a:r>
+              </a:p>
+              <a:p>
+                <a:r>
+                  <a:rPr lang="en-US" dirty="0"/>
+                  <a:t>Type-Based</a:t>
+                </a:r>
+              </a:p>
+              <a:p>
+                <a:r>
+                  <a:rPr lang="en-US" dirty="0"/>
+                  <a:t>data-flow/control-flow analysis based </a:t>
+                </a:r>
+              </a:p>
+              <a:p>
+                <a:r>
+                  <a:rPr lang="en-US" dirty="0"/>
+                  <a:t>Both are worst case estimation</a:t>
+                </a:r>
+              </a:p>
+              <a:p>
+                <a:endParaRPr lang="en-US" dirty="0"/>
+              </a:p>
+              <a:p>
+                <a:r>
+                  <a:rPr lang="en-US" dirty="0"/>
+                  <a:t>Existing Analysis Results:</a:t>
+                </a:r>
+              </a:p>
+              <a:p>
+                <a:r>
+                  <a:rPr lang="en-US" b="1" dirty="0">
+                    <a:solidFill>
+                      <a:srgbClr val="C00000"/>
+                    </a:solidFill>
+                  </a:rPr>
+                  <a:t> </a:t>
+                </a:r>
+                <a14:m>
+                  <m:oMath xmlns:m="http://schemas.openxmlformats.org/officeDocument/2006/math">
+                    <m:sSup>
+                      <m:sSupPr>
+                        <m:ctrlPr>
+                          <a:rPr lang="en-US" b="1" i="1">
+                            <a:solidFill>
+                              <a:srgbClr val="C00000"/>
+                            </a:solidFill>
+                            <a:latin typeface="Cambria Math" panose="02040503050406030204" pitchFamily="18" charset="0"/>
+                          </a:rPr>
+                        </m:ctrlPr>
+                      </m:sSupPr>
+                      <m:e>
+                        <m:r>
+                          <a:rPr lang="en-US" b="1" i="1">
+                            <a:solidFill>
+                              <a:srgbClr val="C00000"/>
+                            </a:solidFill>
+                            <a:latin typeface="Cambria Math" panose="02040503050406030204" pitchFamily="18" charset="0"/>
+                          </a:rPr>
+                          <m:t>𝒂</m:t>
+                        </m:r>
+                      </m:e>
+                      <m:sup>
+                        <m:r>
+                          <a:rPr lang="en-US" b="1" i="1">
+                            <a:solidFill>
+                              <a:srgbClr val="C00000"/>
+                            </a:solidFill>
+                            <a:latin typeface="Cambria Math" panose="02040503050406030204" pitchFamily="18" charset="0"/>
+                          </a:rPr>
+                          <m:t>𝟎</m:t>
+                        </m:r>
+                      </m:sup>
+                    </m:sSup>
+                  </m:oMath>
+                </a14:m>
+                <a:r>
+                  <a:rPr lang="en-US" b="1" dirty="0">
+                    <a:solidFill>
+                      <a:srgbClr val="C00000"/>
+                    </a:solidFill>
+                    <a:sym typeface="Wingdings" pitchFamily="2" charset="2"/>
+                  </a:rPr>
+                  <a:t> 1 </a:t>
+                </a:r>
+                <a:r>
+                  <a:rPr lang="en-US" b="1" dirty="0">
+                    <a:solidFill>
+                      <a:srgbClr val="C00000"/>
+                    </a:solidFill>
+                  </a:rPr>
+                  <a:t>, </a:t>
+                </a:r>
+                <a14:m>
+                  <m:oMath xmlns:m="http://schemas.openxmlformats.org/officeDocument/2006/math">
+                    <m:sSup>
+                      <m:sSupPr>
+                        <m:ctrlPr>
+                          <a:rPr lang="en-US" b="1" i="1">
+                            <a:solidFill>
+                              <a:srgbClr val="C00000"/>
+                            </a:solidFill>
+                            <a:latin typeface="Cambria Math" panose="02040503050406030204" pitchFamily="18" charset="0"/>
+                          </a:rPr>
+                        </m:ctrlPr>
+                      </m:sSupPr>
+                      <m:e>
+                        <m:r>
+                          <a:rPr lang="en-US" b="1" i="1">
+                            <a:solidFill>
+                              <a:srgbClr val="C00000"/>
+                            </a:solidFill>
+                            <a:latin typeface="Cambria Math" panose="02040503050406030204" pitchFamily="18" charset="0"/>
+                          </a:rPr>
+                          <m:t>𝒙</m:t>
+                        </m:r>
+                      </m:e>
+                      <m:sup>
+                        <m:r>
+                          <a:rPr lang="en-US" b="1" i="1">
+                            <a:solidFill>
+                              <a:srgbClr val="C00000"/>
+                            </a:solidFill>
+                            <a:latin typeface="Cambria Math" panose="02040503050406030204" pitchFamily="18" charset="0"/>
+                          </a:rPr>
+                          <m:t>𝟑</m:t>
+                        </m:r>
+                      </m:sup>
+                    </m:sSup>
+                  </m:oMath>
+                </a14:m>
+                <a:r>
+                  <a:rPr lang="en-US" b="1" dirty="0">
+                    <a:solidFill>
+                      <a:srgbClr val="C00000"/>
+                    </a:solidFill>
+                  </a:rPr>
+                  <a:t> </a:t>
+                </a:r>
+                <a:r>
+                  <a:rPr lang="en-US" b="1" dirty="0">
+                    <a:solidFill>
+                      <a:srgbClr val="C00000"/>
+                    </a:solidFill>
+                    <a:sym typeface="Wingdings" pitchFamily="2" charset="2"/>
+                  </a:rPr>
+                  <a:t></a:t>
+                </a:r>
+                <a:r>
+                  <a:rPr lang="en-US" b="1" dirty="0">
+                    <a:solidFill>
+                      <a:srgbClr val="C00000"/>
+                    </a:solidFill>
+                  </a:rPr>
+                  <a:t> k </a:t>
+                </a:r>
+                <a:r>
+                  <a:rPr lang="en-US" b="1" dirty="0">
+                    <a:solidFill>
+                      <a:srgbClr val="C00000"/>
+                    </a:solidFill>
+                    <a:sym typeface="Wingdings" pitchFamily="2" charset="2"/>
+                  </a:rPr>
+                  <a:t>, </a:t>
+                </a:r>
+                <a14:m>
+                  <m:oMath xmlns:m="http://schemas.openxmlformats.org/officeDocument/2006/math">
+                    <m:sSup>
+                      <m:sSupPr>
+                        <m:ctrlPr>
+                          <a:rPr lang="en-US" b="1" i="1">
+                            <a:solidFill>
+                              <a:srgbClr val="C00000"/>
+                            </a:solidFill>
+                            <a:latin typeface="Cambria Math" panose="02040503050406030204" pitchFamily="18" charset="0"/>
+                          </a:rPr>
+                        </m:ctrlPr>
+                      </m:sSupPr>
+                      <m:e>
+                        <m:r>
+                          <a:rPr lang="en-US" b="1" i="1">
+                            <a:solidFill>
+                              <a:srgbClr val="C00000"/>
+                            </a:solidFill>
+                            <a:latin typeface="Cambria Math" panose="02040503050406030204" pitchFamily="18" charset="0"/>
+                          </a:rPr>
+                          <m:t>𝒍</m:t>
+                        </m:r>
+                      </m:e>
+                      <m:sup>
+                        <m:r>
+                          <a:rPr lang="en-US" b="1" i="1">
+                            <a:solidFill>
+                              <a:srgbClr val="C00000"/>
+                            </a:solidFill>
+                            <a:latin typeface="Cambria Math" panose="02040503050406030204" pitchFamily="18" charset="0"/>
+                          </a:rPr>
+                          <m:t>𝟒</m:t>
+                        </m:r>
+                      </m:sup>
+                    </m:sSup>
+                  </m:oMath>
+                </a14:m>
+                <a:r>
+                  <a:rPr lang="en-US" b="1" dirty="0">
+                    <a:solidFill>
+                      <a:srgbClr val="C00000"/>
+                    </a:solidFill>
+                    <a:sym typeface="Wingdings" pitchFamily="2" charset="2"/>
+                  </a:rPr>
+                  <a:t>  </a:t>
+                </a:r>
+                <a14:m>
+                  <m:oMath xmlns:m="http://schemas.openxmlformats.org/officeDocument/2006/math">
+                    <m:r>
+                      <a:rPr lang="en-US" b="1" i="1" smtClean="0">
+                        <a:solidFill>
+                          <a:srgbClr val="C00000"/>
+                        </a:solidFill>
+                        <a:latin typeface="Cambria Math" panose="02040503050406030204" pitchFamily="18" charset="0"/>
+                      </a:rPr>
+                      <m:t>𝒌</m:t>
+                    </m:r>
+                    <m:r>
+                      <a:rPr lang="en-US" b="1" i="1" smtClean="0">
+                        <a:solidFill>
+                          <a:srgbClr val="C00000"/>
+                        </a:solidFill>
+                        <a:latin typeface="Cambria Math" panose="02040503050406030204" pitchFamily="18" charset="0"/>
+                      </a:rPr>
+                      <m:t>∗</m:t>
+                    </m:r>
+                    <m:r>
+                      <a:rPr lang="en-US" b="1" i="1" smtClean="0">
+                        <a:solidFill>
+                          <a:srgbClr val="C00000"/>
+                        </a:solidFill>
+                        <a:latin typeface="Cambria Math" panose="02040503050406030204" pitchFamily="18" charset="0"/>
+                      </a:rPr>
+                      <m:t>𝒌</m:t>
+                    </m:r>
+                  </m:oMath>
+                </a14:m>
+                <a:endParaRPr lang="en-US" b="1" dirty="0">
+                  <a:solidFill>
+                    <a:srgbClr val="C00000"/>
+                  </a:solidFill>
+                </a:endParaRPr>
+              </a:p>
+            </p:txBody>
+          </p:sp>
+        </mc:Choice>
+        <mc:Fallback xmlns="">
+          <p:sp>
+            <p:nvSpPr>
+              <p:cNvPr id="3" name="Content Placeholder 2">
+                <a:extLst>
+                  <a:ext uri="{FF2B5EF4-FFF2-40B4-BE49-F238E27FC236}">
+                    <a16:creationId xmlns:a16="http://schemas.microsoft.com/office/drawing/2014/main" id="{0FB22D9F-8FC0-8C72-5617-8C69B9E65AEA}"/>
+                  </a:ext>
+                </a:extLst>
+              </p:cNvPr>
+              <p:cNvSpPr>
+                <a:spLocks noGrp="1" noRot="1" noChangeAspect="1" noMove="1" noResize="1" noEditPoints="1" noAdjustHandles="1" noChangeArrowheads="1" noChangeShapeType="1" noTextEdit="1"/>
+              </p:cNvSpPr>
+              <p:nvPr>
+                <p:ph idx="1"/>
+              </p:nvPr>
+            </p:nvSpPr>
+            <p:spPr>
+              <a:blipFill>
+                <a:blip r:embed="rId2"/>
+                <a:stretch>
+                  <a:fillRect l="-1122" t="-1303"/>
+                </a:stretch>
+              </a:blipFill>
+            </p:spPr>
+            <p:txBody>
+              <a:bodyPr/>
+              <a:lstStyle/>
+              <a:p>
+                <a:r>
+                  <a:rPr lang="en-US">
+                    <a:noFill/>
+                  </a:rPr>
+                  <a:t> </a:t>
+                </a:r>
+              </a:p>
+            </p:txBody>
+          </p:sp>
+        </mc:Fallback>
+      </mc:AlternateContent>
       <p:sp>
         <p:nvSpPr>
           <p:cNvPr id="4" name="Footer Placeholder 3">
@@ -26576,200 +28120,378 @@
           </a:p>
         </p:txBody>
       </p:sp>
-      <p:sp>
-        <p:nvSpPr>
-          <p:cNvPr id="3" name="Content Placeholder 2">
-            <a:extLst>
-              <a:ext uri="{FF2B5EF4-FFF2-40B4-BE49-F238E27FC236}">
-                <a16:creationId xmlns:a16="http://schemas.microsoft.com/office/drawing/2014/main" id="{0FB22D9F-8FC0-8C72-5617-8C69B9E65AEA}"/>
-              </a:ext>
-            </a:extLst>
-          </p:cNvPr>
-          <p:cNvSpPr>
-            <a:spLocks noGrp="1"/>
-          </p:cNvSpPr>
-          <p:nvPr>
-            <p:ph idx="1"/>
-          </p:nvPr>
-        </p:nvSpPr>
-        <p:spPr>
-          <a:xfrm>
-            <a:off x="609600" y="1828800"/>
-            <a:ext cx="7924800" cy="4191000"/>
-          </a:xfrm>
-        </p:spPr>
-        <p:txBody>
-          <a:bodyPr/>
-          <a:lstStyle/>
-          <a:p>
-            <a:r>
-              <a:rPr lang="en-US" dirty="0"/>
-              <a:t>Methodology: </a:t>
-            </a:r>
-            <a:r>
-              <a:rPr lang="en-US" b="1" dirty="0">
-                <a:solidFill>
-                  <a:srgbClr val="C00000"/>
-                </a:solidFill>
-              </a:rPr>
-              <a:t>Adoption from Adaptivity Analysis</a:t>
-            </a:r>
-          </a:p>
-          <a:p>
-            <a:pPr>
-              <a:buFont typeface="Wingdings" pitchFamily="2" charset="2"/>
-              <a:buChar char="ü"/>
-            </a:pPr>
-            <a:r>
-              <a:rPr lang="en-US" sz="2000" dirty="0"/>
-              <a:t>dependency relation </a:t>
-            </a:r>
-          </a:p>
-          <a:p>
-            <a:pPr>
-              <a:buFont typeface="Wingdings" pitchFamily="2" charset="2"/>
-              <a:buChar char="ü"/>
-            </a:pPr>
-            <a:r>
-              <a:rPr lang="en-US" sz="2000" dirty="0"/>
-              <a:t>dependency quantity </a:t>
-            </a:r>
-          </a:p>
-          <a:p>
-            <a:pPr>
-              <a:buFont typeface="Wingdings" pitchFamily="2" charset="2"/>
-              <a:buChar char="ü"/>
-            </a:pPr>
-            <a:r>
-              <a:rPr lang="en-US" sz="2000" dirty="0"/>
-              <a:t>weighted dependency graph</a:t>
-            </a:r>
-          </a:p>
-          <a:p>
-            <a:pPr>
-              <a:buFont typeface="Wingdings" pitchFamily="2" charset="2"/>
-              <a:buChar char="ü"/>
-            </a:pPr>
-            <a:r>
-              <a:rPr lang="en-US" b="1" dirty="0">
-                <a:solidFill>
-                  <a:srgbClr val="C00000"/>
-                </a:solidFill>
-              </a:rPr>
-              <a:t>annotate variables </a:t>
-            </a:r>
-          </a:p>
-          <a:p>
-            <a:pPr marL="0" indent="0">
-              <a:buNone/>
-            </a:pPr>
-            <a:r>
-              <a:rPr lang="en-US" b="1" dirty="0">
-                <a:solidFill>
-                  <a:srgbClr val="C00000"/>
-                </a:solidFill>
-              </a:rPr>
-              <a:t>       </a:t>
-            </a:r>
-            <a:r>
-              <a:rPr lang="en-US" b="1" u="sng" dirty="0">
-                <a:solidFill>
-                  <a:srgbClr val="C00000"/>
-                </a:solidFill>
-              </a:rPr>
-              <a:t>Assigned by “List” </a:t>
-            </a:r>
-          </a:p>
-          <a:p>
-            <a:pPr>
-              <a:buFont typeface="Wingdings" pitchFamily="2" charset="2"/>
-              <a:buChar char="ü"/>
-            </a:pPr>
-            <a:r>
-              <a:rPr lang="en-US" b="1" dirty="0">
-                <a:solidFill>
-                  <a:srgbClr val="C00000"/>
-                </a:solidFill>
-              </a:rPr>
-              <a:t>compute the longest finite walk</a:t>
-            </a:r>
-          </a:p>
-          <a:p>
-            <a:pPr lvl="1"/>
-            <a:endParaRPr lang="en-US" dirty="0"/>
-          </a:p>
-          <a:p>
-            <a:r>
-              <a:rPr lang="en-US" dirty="0"/>
-              <a:t>Analysis Results: </a:t>
-            </a:r>
-          </a:p>
-          <a:p>
-            <a:pPr marL="0" indent="0">
-              <a:buNone/>
-            </a:pPr>
-            <a:r>
-              <a:rPr lang="en-US" b="1" dirty="0">
-                <a:solidFill>
-                  <a:srgbClr val="C00000"/>
-                </a:solidFill>
-              </a:rPr>
-              <a:t>a </a:t>
-            </a:r>
-            <a:r>
-              <a:rPr lang="en-US" b="1" dirty="0">
-                <a:solidFill>
-                  <a:srgbClr val="C00000"/>
-                </a:solidFill>
-                <a:sym typeface="Wingdings" pitchFamily="2" charset="2"/>
-              </a:rPr>
-              <a:t> 1 </a:t>
-            </a:r>
-            <a:r>
-              <a:rPr lang="en-US" b="1" dirty="0">
-                <a:solidFill>
-                  <a:srgbClr val="C00000"/>
-                </a:solidFill>
-              </a:rPr>
-              <a:t>,  x </a:t>
-            </a:r>
-            <a:r>
-              <a:rPr lang="en-US" b="1" dirty="0">
-                <a:solidFill>
-                  <a:srgbClr val="C00000"/>
-                </a:solidFill>
-                <a:sym typeface="Wingdings" pitchFamily="2" charset="2"/>
-              </a:rPr>
-              <a:t></a:t>
-            </a:r>
-            <a:r>
-              <a:rPr lang="en-US" b="1" dirty="0">
-                <a:solidFill>
-                  <a:srgbClr val="C00000"/>
-                </a:solidFill>
-              </a:rPr>
-              <a:t> 1 </a:t>
-            </a:r>
-            <a:r>
-              <a:rPr lang="en-US" b="1" dirty="0">
-                <a:solidFill>
-                  <a:srgbClr val="C00000"/>
-                </a:solidFill>
-                <a:sym typeface="Wingdings" pitchFamily="2" charset="2"/>
-              </a:rPr>
-              <a:t>,  l4  </a:t>
-            </a:r>
-            <a:r>
-              <a:rPr lang="en-US" b="1" dirty="0">
-                <a:solidFill>
-                  <a:srgbClr val="C00000"/>
-                </a:solidFill>
-              </a:rPr>
-              <a:t>k≈</a:t>
-            </a:r>
-          </a:p>
-        </p:txBody>
-      </p:sp>
+      <mc:AlternateContent xmlns:mc="http://schemas.openxmlformats.org/markup-compatibility/2006" xmlns:a14="http://schemas.microsoft.com/office/drawing/2010/main">
+        <mc:Choice Requires="a14">
+          <p:sp>
+            <p:nvSpPr>
+              <p:cNvPr id="3" name="Content Placeholder 2">
+                <a:extLst>
+                  <a:ext uri="{FF2B5EF4-FFF2-40B4-BE49-F238E27FC236}">
+                    <a16:creationId xmlns:a16="http://schemas.microsoft.com/office/drawing/2014/main" id="{0FB22D9F-8FC0-8C72-5617-8C69B9E65AEA}"/>
+                  </a:ext>
+                </a:extLst>
+              </p:cNvPr>
+              <p:cNvSpPr>
+                <a:spLocks noGrp="1"/>
+              </p:cNvSpPr>
+              <p:nvPr>
+                <p:ph idx="1"/>
+              </p:nvPr>
+            </p:nvSpPr>
+            <p:spPr>
+              <a:xfrm>
+                <a:off x="609600" y="1828800"/>
+                <a:ext cx="8458200" cy="4191000"/>
+              </a:xfrm>
+            </p:spPr>
+            <p:txBody>
+              <a:bodyPr/>
+              <a:lstStyle/>
+              <a:p>
+                <a:r>
+                  <a:rPr lang="en-US" dirty="0"/>
+                  <a:t>Methodology: </a:t>
+                </a:r>
+                <a:r>
+                  <a:rPr lang="en-US" b="1" dirty="0">
+                    <a:solidFill>
+                      <a:srgbClr val="C00000"/>
+                    </a:solidFill>
+                  </a:rPr>
+                  <a:t>adoption from Adaptivity Analysis framework</a:t>
+                </a:r>
+              </a:p>
+              <a:p>
+                <a:pPr>
+                  <a:buFont typeface="Wingdings" pitchFamily="2" charset="2"/>
+                  <a:buChar char="ü"/>
+                </a:pPr>
+                <a:r>
+                  <a:rPr lang="en-US" sz="2000" dirty="0"/>
+                  <a:t>dependency relation </a:t>
+                </a:r>
+              </a:p>
+              <a:p>
+                <a:pPr>
+                  <a:buFont typeface="Wingdings" pitchFamily="2" charset="2"/>
+                  <a:buChar char="ü"/>
+                </a:pPr>
+                <a:r>
+                  <a:rPr lang="en-US" sz="2000" dirty="0"/>
+                  <a:t>dependency quantity </a:t>
+                </a:r>
+              </a:p>
+              <a:p>
+                <a:pPr>
+                  <a:buFont typeface="Wingdings" pitchFamily="2" charset="2"/>
+                  <a:buChar char="ü"/>
+                </a:pPr>
+                <a:r>
+                  <a:rPr lang="en-US" sz="2000" dirty="0"/>
+                  <a:t>weighted dependency graph</a:t>
+                </a:r>
+              </a:p>
+              <a:p>
+                <a:pPr>
+                  <a:buFont typeface="Wingdings" pitchFamily="2" charset="2"/>
+                  <a:buChar char="ü"/>
+                </a:pPr>
+                <a:r>
+                  <a:rPr lang="en-US" b="1" dirty="0">
+                    <a:solidFill>
+                      <a:srgbClr val="C00000"/>
+                    </a:solidFill>
+                  </a:rPr>
+                  <a:t>annotate variables </a:t>
+                </a:r>
+              </a:p>
+              <a:p>
+                <a:pPr marL="0" indent="0">
+                  <a:buNone/>
+                </a:pPr>
+                <a:r>
+                  <a:rPr lang="en-US" b="1" dirty="0">
+                    <a:solidFill>
+                      <a:srgbClr val="C00000"/>
+                    </a:solidFill>
+                  </a:rPr>
+                  <a:t>       </a:t>
+                </a:r>
+                <a:r>
+                  <a:rPr lang="en-US" b="1" u="sng" dirty="0">
+                    <a:solidFill>
+                      <a:srgbClr val="C00000"/>
+                    </a:solidFill>
+                  </a:rPr>
+                  <a:t>Assigned by “List” </a:t>
+                </a:r>
+              </a:p>
+              <a:p>
+                <a:pPr>
+                  <a:buFont typeface="Wingdings" pitchFamily="2" charset="2"/>
+                  <a:buChar char="ü"/>
+                </a:pPr>
+                <a:r>
+                  <a:rPr lang="en-US" b="1" dirty="0">
+                    <a:solidFill>
+                      <a:srgbClr val="C00000"/>
+                    </a:solidFill>
+                  </a:rPr>
+                  <a:t>compute the longest finite walk</a:t>
+                </a:r>
+              </a:p>
+              <a:p>
+                <a:pPr lvl="1"/>
+                <a:endParaRPr lang="en-US" dirty="0"/>
+              </a:p>
+              <a:p>
+                <a:r>
+                  <a:rPr lang="en-US" dirty="0"/>
+                  <a:t>Analysis Results: </a:t>
+                </a:r>
+              </a:p>
+              <a:p>
+                <a:pPr marL="0" indent="0">
+                  <a:buNone/>
+                </a:pPr>
+                <a:r>
+                  <a:rPr lang="en-US" b="1" dirty="0">
+                    <a:solidFill>
+                      <a:srgbClr val="C00000"/>
+                    </a:solidFill>
+                  </a:rPr>
+                  <a:t> </a:t>
+                </a:r>
+                <a14:m>
+                  <m:oMath xmlns:m="http://schemas.openxmlformats.org/officeDocument/2006/math">
+                    <m:sSup>
+                      <m:sSupPr>
+                        <m:ctrlPr>
+                          <a:rPr lang="en-US" b="1" i="1">
+                            <a:solidFill>
+                              <a:srgbClr val="C00000"/>
+                            </a:solidFill>
+                            <a:latin typeface="Cambria Math" panose="02040503050406030204" pitchFamily="18" charset="0"/>
+                          </a:rPr>
+                        </m:ctrlPr>
+                      </m:sSupPr>
+                      <m:e>
+                        <m:r>
+                          <a:rPr lang="en-US" b="1" i="1">
+                            <a:solidFill>
+                              <a:srgbClr val="C00000"/>
+                            </a:solidFill>
+                            <a:latin typeface="Cambria Math" panose="02040503050406030204" pitchFamily="18" charset="0"/>
+                          </a:rPr>
+                          <m:t>𝒂</m:t>
+                        </m:r>
+                      </m:e>
+                      <m:sup>
+                        <m:r>
+                          <a:rPr lang="en-US" b="1" i="1">
+                            <a:solidFill>
+                              <a:srgbClr val="C00000"/>
+                            </a:solidFill>
+                            <a:latin typeface="Cambria Math" panose="02040503050406030204" pitchFamily="18" charset="0"/>
+                          </a:rPr>
+                          <m:t>𝟎</m:t>
+                        </m:r>
+                      </m:sup>
+                    </m:sSup>
+                  </m:oMath>
+                </a14:m>
+                <a:r>
+                  <a:rPr lang="en-US" b="1" dirty="0">
+                    <a:solidFill>
+                      <a:srgbClr val="C00000"/>
+                    </a:solidFill>
+                    <a:sym typeface="Wingdings" pitchFamily="2" charset="2"/>
+                  </a:rPr>
+                  <a:t> 1 </a:t>
+                </a:r>
+                <a:r>
+                  <a:rPr lang="en-US" b="1" dirty="0">
+                    <a:solidFill>
+                      <a:srgbClr val="C00000"/>
+                    </a:solidFill>
+                  </a:rPr>
+                  <a:t>, </a:t>
+                </a:r>
+                <a14:m>
+                  <m:oMath xmlns:m="http://schemas.openxmlformats.org/officeDocument/2006/math">
+                    <m:sSup>
+                      <m:sSupPr>
+                        <m:ctrlPr>
+                          <a:rPr lang="en-US" b="1" i="1">
+                            <a:solidFill>
+                              <a:srgbClr val="C00000"/>
+                            </a:solidFill>
+                            <a:latin typeface="Cambria Math" panose="02040503050406030204" pitchFamily="18" charset="0"/>
+                          </a:rPr>
+                        </m:ctrlPr>
+                      </m:sSupPr>
+                      <m:e>
+                        <m:r>
+                          <a:rPr lang="en-US" b="1" i="1">
+                            <a:solidFill>
+                              <a:srgbClr val="C00000"/>
+                            </a:solidFill>
+                            <a:latin typeface="Cambria Math" panose="02040503050406030204" pitchFamily="18" charset="0"/>
+                          </a:rPr>
+                          <m:t>𝒙</m:t>
+                        </m:r>
+                      </m:e>
+                      <m:sup>
+                        <m:r>
+                          <a:rPr lang="en-US" b="1" i="1">
+                            <a:solidFill>
+                              <a:srgbClr val="C00000"/>
+                            </a:solidFill>
+                            <a:latin typeface="Cambria Math" panose="02040503050406030204" pitchFamily="18" charset="0"/>
+                          </a:rPr>
+                          <m:t>𝟑</m:t>
+                        </m:r>
+                      </m:sup>
+                    </m:sSup>
+                  </m:oMath>
+                </a14:m>
+                <a:r>
+                  <a:rPr lang="en-US" b="1" dirty="0">
+                    <a:solidFill>
+                      <a:srgbClr val="C00000"/>
+                    </a:solidFill>
+                  </a:rPr>
+                  <a:t> </a:t>
+                </a:r>
+                <a:r>
+                  <a:rPr lang="en-US" b="1" dirty="0">
+                    <a:solidFill>
+                      <a:srgbClr val="C00000"/>
+                    </a:solidFill>
+                    <a:sym typeface="Wingdings" pitchFamily="2" charset="2"/>
+                  </a:rPr>
+                  <a:t></a:t>
+                </a:r>
+                <a:r>
+                  <a:rPr lang="en-US" b="1" dirty="0">
+                    <a:solidFill>
+                      <a:srgbClr val="C00000"/>
+                    </a:solidFill>
+                  </a:rPr>
+                  <a:t> 1 </a:t>
+                </a:r>
+                <a:r>
+                  <a:rPr lang="en-US" b="1" dirty="0">
+                    <a:solidFill>
+                      <a:srgbClr val="C00000"/>
+                    </a:solidFill>
+                    <a:sym typeface="Wingdings" pitchFamily="2" charset="2"/>
+                  </a:rPr>
+                  <a:t>, </a:t>
+                </a:r>
+                <a14:m>
+                  <m:oMath xmlns:m="http://schemas.openxmlformats.org/officeDocument/2006/math">
+                    <m:sSup>
+                      <m:sSupPr>
+                        <m:ctrlPr>
+                          <a:rPr lang="en-US" b="1" i="1">
+                            <a:solidFill>
+                              <a:srgbClr val="C00000"/>
+                            </a:solidFill>
+                            <a:latin typeface="Cambria Math" panose="02040503050406030204" pitchFamily="18" charset="0"/>
+                          </a:rPr>
+                        </m:ctrlPr>
+                      </m:sSupPr>
+                      <m:e>
+                        <m:r>
+                          <a:rPr lang="en-US" b="1" i="1">
+                            <a:solidFill>
+                              <a:srgbClr val="C00000"/>
+                            </a:solidFill>
+                            <a:latin typeface="Cambria Math" panose="02040503050406030204" pitchFamily="18" charset="0"/>
+                          </a:rPr>
+                          <m:t>𝒍</m:t>
+                        </m:r>
+                      </m:e>
+                      <m:sup>
+                        <m:r>
+                          <a:rPr lang="en-US" b="1" i="1">
+                            <a:solidFill>
+                              <a:srgbClr val="C00000"/>
+                            </a:solidFill>
+                            <a:latin typeface="Cambria Math" panose="02040503050406030204" pitchFamily="18" charset="0"/>
+                          </a:rPr>
+                          <m:t>𝟒</m:t>
+                        </m:r>
+                      </m:sup>
+                    </m:sSup>
+                  </m:oMath>
+                </a14:m>
+                <a:r>
+                  <a:rPr lang="en-US" b="1" dirty="0">
+                    <a:solidFill>
+                      <a:srgbClr val="C00000"/>
+                    </a:solidFill>
+                    <a:sym typeface="Wingdings" pitchFamily="2" charset="2"/>
+                  </a:rPr>
+                  <a:t>  </a:t>
+                </a:r>
+                <a:r>
+                  <a:rPr lang="en-US" b="1" dirty="0">
+                    <a:solidFill>
+                      <a:srgbClr val="C00000"/>
+                    </a:solidFill>
+                  </a:rPr>
+                  <a:t>k</a:t>
+                </a:r>
+              </a:p>
+            </p:txBody>
+          </p:sp>
+        </mc:Choice>
+        <mc:Fallback xmlns="">
+          <p:sp>
+            <p:nvSpPr>
+              <p:cNvPr id="3" name="Content Placeholder 2">
+                <a:extLst>
+                  <a:ext uri="{FF2B5EF4-FFF2-40B4-BE49-F238E27FC236}">
+                    <a16:creationId xmlns:a16="http://schemas.microsoft.com/office/drawing/2014/main" id="{0FB22D9F-8FC0-8C72-5617-8C69B9E65AEA}"/>
+                  </a:ext>
+                </a:extLst>
+              </p:cNvPr>
+              <p:cNvSpPr>
+                <a:spLocks noGrp="1" noRot="1" noChangeAspect="1" noMove="1" noResize="1" noEditPoints="1" noAdjustHandles="1" noChangeArrowheads="1" noChangeShapeType="1" noTextEdit="1"/>
+              </p:cNvSpPr>
+              <p:nvPr>
+                <p:ph idx="1"/>
+              </p:nvPr>
+            </p:nvSpPr>
+            <p:spPr>
+              <a:xfrm>
+                <a:off x="609600" y="1828800"/>
+                <a:ext cx="8458200" cy="4191000"/>
+              </a:xfrm>
+              <a:blipFill>
+                <a:blip r:embed="rId2"/>
+                <a:stretch>
+                  <a:fillRect l="-1049" t="-1208" b="-906"/>
+                </a:stretch>
+              </a:blipFill>
+            </p:spPr>
+            <p:txBody>
+              <a:bodyPr/>
+              <a:lstStyle/>
+              <a:p>
+                <a:r>
+                  <a:rPr lang="en-US">
+                    <a:noFill/>
+                  </a:rPr>
+                  <a:t> </a:t>
+                </a:r>
+              </a:p>
+            </p:txBody>
+          </p:sp>
+        </mc:Fallback>
+      </mc:AlternateContent>
       <p:sp>
         <p:nvSpPr>
           <p:cNvPr id="4" name="Footer Placeholder 3">
@@ -26855,7 +28577,7 @@
           <p:nvPr/>
         </p:nvPicPr>
         <p:blipFill>
-          <a:blip r:embed="rId2"/>
+          <a:blip r:embed="rId3"/>
           <a:stretch>
             <a:fillRect/>
           </a:stretch>
@@ -27149,192 +28871,438 @@
           </a:p>
         </p:txBody>
       </p:sp>
-      <p:sp>
-        <p:nvSpPr>
-          <p:cNvPr id="3" name="Content Placeholder 2">
-            <a:extLst>
-              <a:ext uri="{FF2B5EF4-FFF2-40B4-BE49-F238E27FC236}">
-                <a16:creationId xmlns:a16="http://schemas.microsoft.com/office/drawing/2014/main" id="{0FB22D9F-8FC0-8C72-5617-8C69B9E65AEA}"/>
-              </a:ext>
-            </a:extLst>
-          </p:cNvPr>
-          <p:cNvSpPr>
-            <a:spLocks noGrp="1"/>
-          </p:cNvSpPr>
-          <p:nvPr>
-            <p:ph idx="1"/>
-          </p:nvPr>
-        </p:nvSpPr>
-        <p:spPr>
-          <a:xfrm>
-            <a:off x="609600" y="1828800"/>
-            <a:ext cx="7924800" cy="4191000"/>
-          </a:xfrm>
-        </p:spPr>
-        <p:txBody>
-          <a:bodyPr/>
-          <a:lstStyle/>
-          <a:p>
-            <a:r>
-              <a:rPr lang="en-US" dirty="0"/>
-              <a:t>Methodology: </a:t>
-            </a:r>
-            <a:r>
-              <a:rPr lang="en-US" b="1" dirty="0">
-                <a:solidFill>
-                  <a:srgbClr val="C00000"/>
-                </a:solidFill>
-              </a:rPr>
-              <a:t>Adoption from Adaptivity Analysis</a:t>
-            </a:r>
-          </a:p>
-          <a:p>
-            <a:pPr>
-              <a:buFont typeface="Wingdings" pitchFamily="2" charset="2"/>
-              <a:buChar char="ü"/>
-            </a:pPr>
-            <a:r>
-              <a:rPr lang="en-US" sz="2000" dirty="0"/>
-              <a:t>dependency relation </a:t>
-            </a:r>
-          </a:p>
-          <a:p>
-            <a:pPr>
-              <a:buFont typeface="Wingdings" pitchFamily="2" charset="2"/>
-              <a:buChar char="ü"/>
-            </a:pPr>
-            <a:r>
-              <a:rPr lang="en-US" sz="2000" dirty="0"/>
-              <a:t>dependency quantity </a:t>
-            </a:r>
-          </a:p>
-          <a:p>
-            <a:pPr>
-              <a:buFont typeface="Wingdings" pitchFamily="2" charset="2"/>
-              <a:buChar char="ü"/>
-            </a:pPr>
-            <a:r>
-              <a:rPr lang="en-US" sz="2000" dirty="0"/>
-              <a:t>weighted dependency graph</a:t>
-            </a:r>
-          </a:p>
-          <a:p>
-            <a:pPr>
-              <a:buFont typeface="Wingdings" pitchFamily="2" charset="2"/>
-              <a:buChar char="ü"/>
-            </a:pPr>
-            <a:r>
-              <a:rPr lang="en-US" b="1" dirty="0">
-                <a:solidFill>
-                  <a:srgbClr val="C00000"/>
-                </a:solidFill>
-              </a:rPr>
-              <a:t>annotate variables </a:t>
-            </a:r>
-          </a:p>
-          <a:p>
-            <a:pPr marL="0" indent="0">
-              <a:buNone/>
-            </a:pPr>
-            <a:r>
-              <a:rPr lang="en-US" b="1" dirty="0">
-                <a:solidFill>
-                  <a:srgbClr val="C00000"/>
-                </a:solidFill>
-              </a:rPr>
-              <a:t>       Assigned by “Sampling” </a:t>
-            </a:r>
-          </a:p>
-          <a:p>
-            <a:pPr>
-              <a:buFont typeface="Wingdings" pitchFamily="2" charset="2"/>
-              <a:buChar char="ü"/>
-            </a:pPr>
-            <a:r>
-              <a:rPr lang="en-US" b="1" dirty="0">
-                <a:solidFill>
-                  <a:srgbClr val="C00000"/>
-                </a:solidFill>
-              </a:rPr>
-              <a:t>compute the longest finite walk</a:t>
-            </a:r>
-          </a:p>
-          <a:p>
-            <a:pPr lvl="1"/>
-            <a:endParaRPr lang="en-US" dirty="0"/>
-          </a:p>
-          <a:p>
-            <a:r>
-              <a:rPr lang="en-US" dirty="0"/>
-              <a:t>Analysis Results: </a:t>
-            </a:r>
-          </a:p>
-          <a:p>
-            <a:pPr marL="0" indent="0">
-              <a:buNone/>
-            </a:pPr>
-            <a:r>
-              <a:rPr lang="en-US" b="1" dirty="0">
-                <a:solidFill>
-                  <a:srgbClr val="C00000"/>
-                </a:solidFill>
-              </a:rPr>
-              <a:t>a </a:t>
-            </a:r>
-            <a:r>
-              <a:rPr lang="en-US" b="1" dirty="0">
-                <a:solidFill>
-                  <a:srgbClr val="C00000"/>
-                </a:solidFill>
-                <a:sym typeface="Wingdings" pitchFamily="2" charset="2"/>
-              </a:rPr>
-              <a:t> 1 </a:t>
-            </a:r>
-            <a:r>
-              <a:rPr lang="en-US" b="1" dirty="0">
-                <a:solidFill>
-                  <a:srgbClr val="C00000"/>
-                </a:solidFill>
-              </a:rPr>
-              <a:t>,  x </a:t>
-            </a:r>
-            <a:r>
-              <a:rPr lang="en-US" b="1" dirty="0">
-                <a:solidFill>
-                  <a:srgbClr val="C00000"/>
-                </a:solidFill>
-                <a:sym typeface="Wingdings" pitchFamily="2" charset="2"/>
-              </a:rPr>
-              <a:t></a:t>
-            </a:r>
-            <a:r>
-              <a:rPr lang="en-US" b="1" dirty="0">
-                <a:solidFill>
-                  <a:srgbClr val="C00000"/>
-                </a:solidFill>
-              </a:rPr>
-              <a:t> 1 </a:t>
-            </a:r>
-            <a:r>
-              <a:rPr lang="en-US" b="1" dirty="0">
-                <a:solidFill>
-                  <a:srgbClr val="C00000"/>
-                </a:solidFill>
-                <a:sym typeface="Wingdings" pitchFamily="2" charset="2"/>
-              </a:rPr>
-              <a:t>,  l4  </a:t>
-            </a:r>
-            <a:r>
-              <a:rPr lang="en-US" b="1" dirty="0">
-                <a:solidFill>
-                  <a:srgbClr val="C00000"/>
-                </a:solidFill>
-              </a:rPr>
-              <a:t>k</a:t>
-            </a:r>
-          </a:p>
-        </p:txBody>
-      </p:sp>
+      <mc:AlternateContent xmlns:mc="http://schemas.openxmlformats.org/markup-compatibility/2006" xmlns:a14="http://schemas.microsoft.com/office/drawing/2010/main">
+        <mc:Choice Requires="a14">
+          <p:sp>
+            <p:nvSpPr>
+              <p:cNvPr id="3" name="Content Placeholder 2">
+                <a:extLst>
+                  <a:ext uri="{FF2B5EF4-FFF2-40B4-BE49-F238E27FC236}">
+                    <a16:creationId xmlns:a16="http://schemas.microsoft.com/office/drawing/2014/main" id="{0FB22D9F-8FC0-8C72-5617-8C69B9E65AEA}"/>
+                  </a:ext>
+                </a:extLst>
+              </p:cNvPr>
+              <p:cNvSpPr>
+                <a:spLocks noGrp="1"/>
+              </p:cNvSpPr>
+              <p:nvPr>
+                <p:ph idx="1"/>
+              </p:nvPr>
+            </p:nvSpPr>
+            <p:spPr>
+              <a:xfrm>
+                <a:off x="609600" y="1828800"/>
+                <a:ext cx="8458200" cy="4191000"/>
+              </a:xfrm>
+            </p:spPr>
+            <p:txBody>
+              <a:bodyPr/>
+              <a:lstStyle/>
+              <a:p>
+                <a:r>
+                  <a:rPr lang="en-US" dirty="0"/>
+                  <a:t>Methodology: </a:t>
+                </a:r>
+                <a:r>
+                  <a:rPr lang="en-US" b="1" dirty="0">
+                    <a:solidFill>
+                      <a:srgbClr val="C00000"/>
+                    </a:solidFill>
+                  </a:rPr>
+                  <a:t>adoption from Adaptivity Analysis framework</a:t>
+                </a:r>
+              </a:p>
+              <a:p>
+                <a:pPr>
+                  <a:buFont typeface="Wingdings" pitchFamily="2" charset="2"/>
+                  <a:buChar char="ü"/>
+                </a:pPr>
+                <a:r>
+                  <a:rPr lang="en-US" sz="2000" dirty="0"/>
+                  <a:t>dependency relation </a:t>
+                </a:r>
+              </a:p>
+              <a:p>
+                <a:pPr>
+                  <a:buFont typeface="Wingdings" pitchFamily="2" charset="2"/>
+                  <a:buChar char="ü"/>
+                </a:pPr>
+                <a:r>
+                  <a:rPr lang="en-US" sz="2000" dirty="0"/>
+                  <a:t>dependency quantity </a:t>
+                </a:r>
+              </a:p>
+              <a:p>
+                <a:pPr>
+                  <a:buFont typeface="Wingdings" pitchFamily="2" charset="2"/>
+                  <a:buChar char="ü"/>
+                </a:pPr>
+                <a:r>
+                  <a:rPr lang="en-US" sz="2000" dirty="0"/>
+                  <a:t>weighted dependency graph</a:t>
+                </a:r>
+              </a:p>
+              <a:p>
+                <a:pPr>
+                  <a:buFont typeface="Wingdings" pitchFamily="2" charset="2"/>
+                  <a:buChar char="ü"/>
+                </a:pPr>
+                <a:r>
+                  <a:rPr lang="en-US" b="1" dirty="0">
+                    <a:solidFill>
+                      <a:srgbClr val="C00000"/>
+                    </a:solidFill>
+                  </a:rPr>
+                  <a:t>annotate variables </a:t>
+                </a:r>
+              </a:p>
+              <a:p>
+                <a:pPr marL="0" indent="0">
+                  <a:buNone/>
+                </a:pPr>
+                <a:r>
+                  <a:rPr lang="en-US" b="1" dirty="0">
+                    <a:solidFill>
+                      <a:srgbClr val="C00000"/>
+                    </a:solidFill>
+                  </a:rPr>
+                  <a:t>       Assigned by “Sampling” </a:t>
+                </a:r>
+              </a:p>
+              <a:p>
+                <a:pPr>
+                  <a:buFont typeface="Wingdings" pitchFamily="2" charset="2"/>
+                  <a:buChar char="ü"/>
+                </a:pPr>
+                <a:r>
+                  <a:rPr lang="en-US" b="1" dirty="0">
+                    <a:solidFill>
+                      <a:srgbClr val="C00000"/>
+                    </a:solidFill>
+                  </a:rPr>
+                  <a:t>compute the longest finite walk</a:t>
+                </a:r>
+              </a:p>
+              <a:p>
+                <a:pPr lvl="1"/>
+                <a:endParaRPr lang="en-US" dirty="0"/>
+              </a:p>
+              <a:p>
+                <a:r>
+                  <a:rPr lang="en-US" dirty="0"/>
+                  <a:t>Analysis Results: </a:t>
+                </a:r>
+              </a:p>
+              <a:p>
+                <a:pPr marL="0" indent="0">
+                  <a:buNone/>
+                </a:pPr>
+                <a14:m>
+                  <m:oMath xmlns:m="http://schemas.openxmlformats.org/officeDocument/2006/math">
+                    <m:sSup>
+                      <m:sSupPr>
+                        <m:ctrlPr>
+                          <a:rPr lang="en-US" b="1" i="1">
+                            <a:solidFill>
+                              <a:srgbClr val="C00000"/>
+                            </a:solidFill>
+                            <a:latin typeface="Cambria Math" panose="02040503050406030204" pitchFamily="18" charset="0"/>
+                          </a:rPr>
+                        </m:ctrlPr>
+                      </m:sSupPr>
+                      <m:e>
+                        <m:r>
+                          <a:rPr lang="en-US" b="1" i="1" smtClean="0">
+                            <a:solidFill>
+                              <a:srgbClr val="C00000"/>
+                            </a:solidFill>
+                            <a:latin typeface="Cambria Math" panose="02040503050406030204" pitchFamily="18" charset="0"/>
+                          </a:rPr>
+                          <m:t>𝒙</m:t>
+                        </m:r>
+                      </m:e>
+                      <m:sup>
+                        <m:r>
+                          <a:rPr lang="en-US" b="1" i="1" smtClean="0">
+                            <a:solidFill>
+                              <a:srgbClr val="C00000"/>
+                            </a:solidFill>
+                            <a:latin typeface="Cambria Math" panose="02040503050406030204" pitchFamily="18" charset="0"/>
+                          </a:rPr>
+                          <m:t>𝟑</m:t>
+                        </m:r>
+                      </m:sup>
+                    </m:sSup>
+                  </m:oMath>
+                </a14:m>
+                <a:r>
+                  <a:rPr lang="en-US" b="1" dirty="0">
+                    <a:solidFill>
+                      <a:srgbClr val="C00000"/>
+                    </a:solidFill>
+                  </a:rPr>
+                  <a:t> </a:t>
+                </a:r>
+                <a:r>
+                  <a:rPr lang="en-US" b="1" dirty="0">
+                    <a:solidFill>
+                      <a:srgbClr val="C00000"/>
+                    </a:solidFill>
+                    <a:sym typeface="Wingdings" pitchFamily="2" charset="2"/>
+                  </a:rPr>
+                  <a:t></a:t>
+                </a:r>
+                <a:r>
+                  <a:rPr lang="en-US" b="1" dirty="0">
+                    <a:solidFill>
+                      <a:srgbClr val="C00000"/>
+                    </a:solidFill>
+                  </a:rPr>
+                  <a:t> </a:t>
+                </a:r>
+                <a14:m>
+                  <m:oMath xmlns:m="http://schemas.openxmlformats.org/officeDocument/2006/math">
+                    <m:sSub>
+                      <m:sSubPr>
+                        <m:ctrlPr>
+                          <a:rPr lang="en-US" b="1" i="1" smtClean="0">
+                            <a:solidFill>
+                              <a:srgbClr val="C00000"/>
+                            </a:solidFill>
+                            <a:latin typeface="Cambria Math" panose="02040503050406030204" pitchFamily="18" charset="0"/>
+                          </a:rPr>
+                        </m:ctrlPr>
+                      </m:sSubPr>
+                      <m:e>
+                        <m:r>
+                          <a:rPr lang="en-US" b="1" i="1" smtClean="0">
+                            <a:solidFill>
+                              <a:srgbClr val="C00000"/>
+                            </a:solidFill>
+                            <a:latin typeface="Cambria Math" panose="02040503050406030204" pitchFamily="18" charset="0"/>
+                          </a:rPr>
+                          <m:t>𝑷</m:t>
+                        </m:r>
+                      </m:e>
+                      <m:sub>
+                        <m:r>
+                          <a:rPr lang="en-US" b="1" i="1" smtClean="0">
+                            <a:solidFill>
+                              <a:srgbClr val="C00000"/>
+                            </a:solidFill>
+                            <a:latin typeface="Cambria Math" panose="02040503050406030204" pitchFamily="18" charset="0"/>
+                          </a:rPr>
+                          <m:t>𝒊</m:t>
+                        </m:r>
+                        <m:r>
+                          <a:rPr lang="en-US" b="1" i="1" smtClean="0">
+                            <a:solidFill>
+                              <a:srgbClr val="C00000"/>
+                            </a:solidFill>
+                            <a:latin typeface="Cambria Math" panose="02040503050406030204" pitchFamily="18" charset="0"/>
+                          </a:rPr>
+                          <m:t>∈[</m:t>
+                        </m:r>
+                        <m:r>
+                          <a:rPr lang="en-US" b="1" i="1" smtClean="0">
+                            <a:solidFill>
+                              <a:srgbClr val="C00000"/>
+                            </a:solidFill>
+                            <a:latin typeface="Cambria Math" panose="02040503050406030204" pitchFamily="18" charset="0"/>
+                          </a:rPr>
+                          <m:t>𝟎</m:t>
+                        </m:r>
+                        <m:r>
+                          <a:rPr lang="en-US" b="1" i="1" smtClean="0">
+                            <a:solidFill>
+                              <a:srgbClr val="C00000"/>
+                            </a:solidFill>
+                            <a:latin typeface="Cambria Math" panose="02040503050406030204" pitchFamily="18" charset="0"/>
+                          </a:rPr>
+                          <m:t>, </m:t>
+                        </m:r>
+                        <m:r>
+                          <a:rPr lang="en-US" b="1" i="1" smtClean="0">
+                            <a:solidFill>
+                              <a:srgbClr val="C00000"/>
+                            </a:solidFill>
+                            <a:latin typeface="Cambria Math" panose="02040503050406030204" pitchFamily="18" charset="0"/>
+                          </a:rPr>
+                          <m:t>𝒌</m:t>
+                        </m:r>
+                        <m:r>
+                          <a:rPr lang="en-US" b="1" i="1" smtClean="0">
+                            <a:solidFill>
+                              <a:srgbClr val="C00000"/>
+                            </a:solidFill>
+                            <a:latin typeface="Cambria Math" panose="02040503050406030204" pitchFamily="18" charset="0"/>
+                          </a:rPr>
+                          <m:t>]</m:t>
+                        </m:r>
+                      </m:sub>
+                    </m:sSub>
+                    <m:r>
+                      <a:rPr lang="en-US" b="1" i="0" smtClean="0">
+                        <a:solidFill>
+                          <a:srgbClr val="C00000"/>
+                        </a:solidFill>
+                        <a:latin typeface="Cambria Math" panose="02040503050406030204" pitchFamily="18" charset="0"/>
+                      </a:rPr>
+                      <m:t>(</m:t>
+                    </m:r>
+                    <m:sSup>
+                      <m:sSupPr>
+                        <m:ctrlPr>
+                          <a:rPr lang="en-US" b="1" i="1">
+                            <a:solidFill>
+                              <a:srgbClr val="C00000"/>
+                            </a:solidFill>
+                            <a:latin typeface="Cambria Math" panose="02040503050406030204" pitchFamily="18" charset="0"/>
+                          </a:rPr>
+                        </m:ctrlPr>
+                      </m:sSupPr>
+                      <m:e>
+                        <m:r>
+                          <a:rPr lang="en-US" b="1" i="1">
+                            <a:solidFill>
+                              <a:srgbClr val="C00000"/>
+                            </a:solidFill>
+                            <a:latin typeface="Cambria Math" panose="02040503050406030204" pitchFamily="18" charset="0"/>
+                          </a:rPr>
+                          <m:t>𝒙</m:t>
+                        </m:r>
+                      </m:e>
+                      <m:sup>
+                        <m:r>
+                          <a:rPr lang="en-US" b="1" i="1">
+                            <a:solidFill>
+                              <a:srgbClr val="C00000"/>
+                            </a:solidFill>
+                            <a:latin typeface="Cambria Math" panose="02040503050406030204" pitchFamily="18" charset="0"/>
+                          </a:rPr>
+                          <m:t>𝟑</m:t>
+                        </m:r>
+                      </m:sup>
+                    </m:sSup>
+                    <m:r>
+                      <a:rPr lang="en-US" b="1" i="1" smtClean="0">
+                        <a:solidFill>
+                          <a:srgbClr val="C00000"/>
+                        </a:solidFill>
+                        <a:latin typeface="Cambria Math" panose="02040503050406030204" pitchFamily="18" charset="0"/>
+                      </a:rPr>
+                      <m:t>=</m:t>
+                    </m:r>
+                    <m:r>
+                      <a:rPr lang="en-US" b="1" i="1" smtClean="0">
+                        <a:solidFill>
+                          <a:srgbClr val="C00000"/>
+                        </a:solidFill>
+                        <a:latin typeface="Cambria Math" panose="02040503050406030204" pitchFamily="18" charset="0"/>
+                      </a:rPr>
+                      <m:t>𝒊</m:t>
+                    </m:r>
+                    <m:r>
+                      <a:rPr lang="en-US" b="1" i="1" smtClean="0">
+                        <a:solidFill>
+                          <a:srgbClr val="C00000"/>
+                        </a:solidFill>
+                        <a:latin typeface="Cambria Math" panose="02040503050406030204" pitchFamily="18" charset="0"/>
+                      </a:rPr>
+                      <m:t>)= </m:t>
+                    </m:r>
+                    <m:f>
+                      <m:fPr>
+                        <m:ctrlPr>
+                          <a:rPr lang="en-US" b="1" i="1" smtClean="0">
+                            <a:solidFill>
+                              <a:srgbClr val="C00000"/>
+                            </a:solidFill>
+                            <a:latin typeface="Cambria Math" panose="02040503050406030204" pitchFamily="18" charset="0"/>
+                          </a:rPr>
+                        </m:ctrlPr>
+                      </m:fPr>
+                      <m:num>
+                        <m:r>
+                          <a:rPr lang="en-US" b="1" i="1" smtClean="0">
+                            <a:solidFill>
+                              <a:srgbClr val="C00000"/>
+                            </a:solidFill>
+                            <a:latin typeface="Cambria Math" panose="02040503050406030204" pitchFamily="18" charset="0"/>
+                          </a:rPr>
+                          <m:t>𝟏</m:t>
+                        </m:r>
+                      </m:num>
+                      <m:den>
+                        <m:r>
+                          <a:rPr lang="en-US" b="1" i="1" smtClean="0">
+                            <a:solidFill>
+                              <a:srgbClr val="C00000"/>
+                            </a:solidFill>
+                            <a:latin typeface="Cambria Math" panose="02040503050406030204" pitchFamily="18" charset="0"/>
+                          </a:rPr>
+                          <m:t>𝒌</m:t>
+                        </m:r>
+                      </m:den>
+                    </m:f>
+                  </m:oMath>
+                </a14:m>
+                <a:r>
+                  <a:rPr lang="en-US" b="1" dirty="0">
+                    <a:solidFill>
+                      <a:srgbClr val="C00000"/>
+                    </a:solidFill>
+                  </a:rPr>
+                  <a:t> </a:t>
+                </a:r>
+              </a:p>
+            </p:txBody>
+          </p:sp>
+        </mc:Choice>
+        <mc:Fallback xmlns="">
+          <p:sp>
+            <p:nvSpPr>
+              <p:cNvPr id="3" name="Content Placeholder 2">
+                <a:extLst>
+                  <a:ext uri="{FF2B5EF4-FFF2-40B4-BE49-F238E27FC236}">
+                    <a16:creationId xmlns:a16="http://schemas.microsoft.com/office/drawing/2014/main" id="{0FB22D9F-8FC0-8C72-5617-8C69B9E65AEA}"/>
+                  </a:ext>
+                </a:extLst>
+              </p:cNvPr>
+              <p:cNvSpPr>
+                <a:spLocks noGrp="1" noRot="1" noChangeAspect="1" noMove="1" noResize="1" noEditPoints="1" noAdjustHandles="1" noChangeArrowheads="1" noChangeShapeType="1" noTextEdit="1"/>
+              </p:cNvSpPr>
+              <p:nvPr>
+                <p:ph idx="1"/>
+              </p:nvPr>
+            </p:nvSpPr>
+            <p:spPr>
+              <a:xfrm>
+                <a:off x="609600" y="1828800"/>
+                <a:ext cx="8458200" cy="4191000"/>
+              </a:xfrm>
+              <a:blipFill>
+                <a:blip r:embed="rId2"/>
+                <a:stretch>
+                  <a:fillRect l="-1049" t="-1208" b="-3021"/>
+                </a:stretch>
+              </a:blipFill>
+            </p:spPr>
+            <p:txBody>
+              <a:bodyPr/>
+              <a:lstStyle/>
+              <a:p>
+                <a:r>
+                  <a:rPr lang="en-US">
+                    <a:noFill/>
+                  </a:rPr>
+                  <a:t> </a:t>
+                </a:r>
+              </a:p>
+            </p:txBody>
+          </p:sp>
+        </mc:Fallback>
+      </mc:AlternateContent>
       <p:sp>
         <p:nvSpPr>
           <p:cNvPr id="4" name="Footer Placeholder 3">
@@ -27420,14 +29388,14 @@
           <p:nvPr/>
         </p:nvPicPr>
         <p:blipFill>
-          <a:blip r:embed="rId2"/>
+          <a:blip r:embed="rId3"/>
           <a:stretch>
             <a:fillRect/>
           </a:stretch>
         </p:blipFill>
         <p:spPr>
           <a:xfrm>
-            <a:off x="5334000" y="2514600"/>
+            <a:off x="5474997" y="2209800"/>
             <a:ext cx="3325359" cy="3149600"/>
           </a:xfrm>
           <a:prstGeom prst="rect">
@@ -27837,21 +29805,29 @@
             <a:pPr lvl="1"/>
             <a:r>
               <a:rPr lang="en-US" sz="1600" dirty="0"/>
-              <a:t>September 05, 2022: Finish the improved execution-based dependency depth analysis and implementation </a:t>
+              <a:t>September 05, 2022: Finishing the execution-based dependency analysis extension and implementation,</a:t>
             </a:r>
           </a:p>
           <a:p>
             <a:pPr lvl="1"/>
             <a:r>
               <a:rPr lang="en-US" sz="1600" dirty="0"/>
-              <a:t>September 20, 2022: Finish Path Sensitive Reachability Bound Algorithm design and starting implementation </a:t>
+              <a:t>September 20, 2022: For the static adaptivity analysis extension, finishing the </a:t>
+            </a:r>
+            <a:r>
+              <a:rPr lang="en-US" sz="1600" b="1" i="1" dirty="0"/>
+              <a:t>Path Sensitive Reachability Bound Algorithm </a:t>
+            </a:r>
+            <a:r>
+              <a:rPr lang="en-US" sz="1600" dirty="0"/>
+              <a:t>design and implementation,</a:t>
             </a:r>
           </a:p>
           <a:p>
             <a:pPr lvl="1"/>
             <a:r>
               <a:rPr lang="en-US" sz="1600" dirty="0"/>
-              <a:t>September 30, 2022: Finish Path Sensitive Reachability Bound Algorithm implementation and formalization. </a:t>
+              <a:t>September 30, 2022: Generalizing this program analysis framework onto program’s different quantitative properties analysis. </a:t>
             </a:r>
           </a:p>
           <a:p>
@@ -27865,7 +29841,15 @@
             <a:pPr lvl="1"/>
             <a:r>
               <a:rPr lang="en-US" sz="1600" dirty="0"/>
-              <a:t>November 05, 2022: Finish Path Sensitive Reachability Bound paper writing and Submit to PLDI 2023 </a:t>
+              <a:t>November 05, 2022: Finalizing the </a:t>
+            </a:r>
+            <a:r>
+              <a:rPr lang="en-US" sz="1600" b="1" i="1" dirty="0"/>
+              <a:t>Path Sensitive Reachability Bound Algorithm</a:t>
+            </a:r>
+            <a:r>
+              <a:rPr lang="en-US" sz="1600" dirty="0"/>
+              <a:t> and submitting the paper to PLDI 2023 </a:t>
             </a:r>
           </a:p>
           <a:p>

</xml_diff>